<commit_message>
script and ppt updates
</commit_message>
<xml_diff>
--- a/docs/MeganBall_Energy_DataStory_DS6390.pptx
+++ b/docs/MeganBall_Energy_DataStory_DS6390.pptx
@@ -5,18 +5,17 @@
     <p:sldMasterId id="2147484032" r:id="rId1"/>
   </p:sldMasterIdLst>
   <p:notesMasterIdLst>
-    <p:notesMasterId r:id="rId11"/>
+    <p:notesMasterId r:id="rId10"/>
   </p:notesMasterIdLst>
   <p:sldIdLst>
     <p:sldId id="256" r:id="rId2"/>
     <p:sldId id="262" r:id="rId3"/>
     <p:sldId id="264" r:id="rId4"/>
-    <p:sldId id="257" r:id="rId5"/>
-    <p:sldId id="263" r:id="rId6"/>
-    <p:sldId id="258" r:id="rId7"/>
-    <p:sldId id="259" r:id="rId8"/>
-    <p:sldId id="260" r:id="rId9"/>
-    <p:sldId id="261" r:id="rId10"/>
+    <p:sldId id="265" r:id="rId5"/>
+    <p:sldId id="259" r:id="rId6"/>
+    <p:sldId id="260" r:id="rId7"/>
+    <p:sldId id="266" r:id="rId8"/>
+    <p:sldId id="261" r:id="rId9"/>
   </p:sldIdLst>
   <p:sldSz cx="12192000" cy="6858000"/>
   <p:notesSz cx="6858000" cy="9144000"/>
@@ -205,7 +204,7 @@
           <a:p>
             <a:fld id="{87165AAF-A174-4899-9C98-240C6E515E56}" type="datetimeFigureOut">
               <a:rPr lang="en-US" smtClean="0"/>
-              <a:t>3/31/2021</a:t>
+              <a:t>4/3/2021</a:t>
             </a:fld>
             <a:endParaRPr lang="en-US"/>
           </a:p>
@@ -672,7 +671,7 @@
           <a:p>
             <a:fld id="{4C5CDE66-1C9A-4F85-8198-25A5F1B8480F}" type="datetime1">
               <a:rPr lang="en-US" smtClean="0"/>
-              <a:t>3/31/2021</a:t>
+              <a:t>4/3/2021</a:t>
             </a:fld>
             <a:endParaRPr lang="en-US"/>
           </a:p>
@@ -865,7 +864,7 @@
           <a:p>
             <a:fld id="{7E8D9117-DBDB-4ABB-B50C-CE88C5A22694}" type="datetime1">
               <a:rPr lang="en-US" smtClean="0"/>
-              <a:t>3/31/2021</a:t>
+              <a:t>4/3/2021</a:t>
             </a:fld>
             <a:endParaRPr lang="en-US"/>
           </a:p>
@@ -1048,7 +1047,7 @@
           <a:p>
             <a:fld id="{E5B8A6FF-2D3B-450C-96BB-E7B3522660F1}" type="datetime1">
               <a:rPr lang="en-US" smtClean="0"/>
-              <a:t>3/31/2021</a:t>
+              <a:t>4/3/2021</a:t>
             </a:fld>
             <a:endParaRPr lang="en-US"/>
           </a:p>
@@ -1221,7 +1220,7 @@
           <a:p>
             <a:fld id="{8AABB569-6338-44DD-87FD-27043EC8CF30}" type="datetime1">
               <a:rPr lang="en-US" smtClean="0"/>
-              <a:t>3/31/2021</a:t>
+              <a:t>4/3/2021</a:t>
             </a:fld>
             <a:endParaRPr lang="en-US"/>
           </a:p>
@@ -1480,7 +1479,7 @@
           <a:p>
             <a:fld id="{5CDB86DE-9D57-456D-AEAF-EF2DFEFB3CAE}" type="datetime1">
               <a:rPr lang="en-US" smtClean="0"/>
-              <a:t>3/31/2021</a:t>
+              <a:t>4/3/2021</a:t>
             </a:fld>
             <a:endParaRPr lang="en-US"/>
           </a:p>
@@ -1771,7 +1770,7 @@
           <a:p>
             <a:fld id="{EB73B8A5-03A7-4DA3-89AB-673A1834436C}" type="datetime1">
               <a:rPr lang="en-US" smtClean="0"/>
-              <a:t>3/31/2021</a:t>
+              <a:t>4/3/2021</a:t>
             </a:fld>
             <a:endParaRPr lang="en-US"/>
           </a:p>
@@ -2217,7 +2216,7 @@
           <a:p>
             <a:fld id="{3112E527-F95A-41A3-8494-407D918E6E0C}" type="datetime1">
               <a:rPr lang="en-US" smtClean="0"/>
-              <a:t>3/31/2021</a:t>
+              <a:t>4/3/2021</a:t>
             </a:fld>
             <a:endParaRPr lang="en-US"/>
           </a:p>
@@ -2338,7 +2337,7 @@
           <a:p>
             <a:fld id="{2057769E-D349-4077-9949-5DEE102A7134}" type="datetime1">
               <a:rPr lang="en-US" smtClean="0"/>
-              <a:t>3/31/2021</a:t>
+              <a:t>4/3/2021</a:t>
             </a:fld>
             <a:endParaRPr lang="en-US"/>
           </a:p>
@@ -2436,7 +2435,7 @@
           <a:p>
             <a:fld id="{872E71A3-19A2-452B-9F43-438F4E1B6D09}" type="datetime1">
               <a:rPr lang="en-US" smtClean="0"/>
-              <a:t>3/31/2021</a:t>
+              <a:t>4/3/2021</a:t>
             </a:fld>
             <a:endParaRPr lang="en-US"/>
           </a:p>
@@ -2795,7 +2794,7 @@
           <a:p>
             <a:fld id="{D594CEB8-6FAD-49D3-B656-81EF1B8E66BC}" type="datetime1">
               <a:rPr lang="en-US" smtClean="0"/>
-              <a:t>3/31/2021</a:t>
+              <a:t>4/3/2021</a:t>
             </a:fld>
             <a:endParaRPr lang="en-US"/>
           </a:p>
@@ -3119,7 +3118,7 @@
           <a:p>
             <a:fld id="{CA18CEF7-AB07-488F-8992-CBA98D2BF9B9}" type="datetime1">
               <a:rPr lang="en-US" smtClean="0"/>
-              <a:t>3/31/2021</a:t>
+              <a:t>4/3/2021</a:t>
             </a:fld>
             <a:endParaRPr lang="en-US"/>
           </a:p>
@@ -3355,7 +3354,7 @@
           <a:p>
             <a:fld id="{3FE4961D-FEAA-49B7-A04F-6FF086358B9F}" type="datetime1">
               <a:rPr lang="en-US" smtClean="0"/>
-              <a:t>3/31/2021</a:t>
+              <a:t>4/3/2021</a:t>
             </a:fld>
             <a:endParaRPr lang="en-US"/>
           </a:p>
@@ -4162,7 +4161,12 @@
             <p:ph type="title"/>
           </p:nvPr>
         </p:nvSpPr>
-        <p:spPr/>
+        <p:spPr>
+          <a:xfrm>
+            <a:off x="657606" y="0"/>
+            <a:ext cx="10772775" cy="1658198"/>
+          </a:xfrm>
+        </p:spPr>
         <p:txBody>
           <a:bodyPr/>
           <a:lstStyle/>
@@ -4198,54 +4202,26 @@
           <a:lstStyle/>
           <a:p>
             <a:r>
-              <a:rPr lang="en-US" sz="2400" dirty="0"/>
+              <a:rPr lang="en-US" sz="2800" dirty="0"/>
+              <a:t>How does the US compare in greenhouse gas emissions?</a:t>
+            </a:r>
+          </a:p>
+          <a:p>
+            <a:r>
+              <a:rPr lang="en-US" sz="2800" dirty="0"/>
               <a:t>What is the current percent of energy being generated by renewable sources in the US?</a:t>
             </a:r>
           </a:p>
           <a:p>
             <a:r>
-              <a:rPr lang="en-US" sz="2400" dirty="0"/>
-              <a:t>Why is it important to reduce conventional thermal energy sources?</a:t>
-            </a:r>
-          </a:p>
-          <a:p>
-            <a:r>
-              <a:rPr lang="en-US" sz="2400" dirty="0"/>
-              <a:t>A case study in European energy generation</a:t>
-            </a:r>
-          </a:p>
-          <a:p>
-            <a:r>
-              <a:rPr lang="en-US" sz="2400" dirty="0"/>
-              <a:t>The state of reliability of the grid</a:t>
-            </a:r>
-          </a:p>
-        </p:txBody>
-      </p:sp>
-      <p:sp>
-        <p:nvSpPr>
-          <p:cNvPr id="4" name="Footer Placeholder 3">
-            <a:extLst>
-              <a:ext uri="{FF2B5EF4-FFF2-40B4-BE49-F238E27FC236}">
-                <a16:creationId xmlns:a16="http://schemas.microsoft.com/office/drawing/2014/main" id="{E492AEB3-0348-45DE-A625-2A06C027C7C8}"/>
-              </a:ext>
-            </a:extLst>
-          </p:cNvPr>
-          <p:cNvSpPr>
-            <a:spLocks noGrp="1"/>
-          </p:cNvSpPr>
-          <p:nvPr>
-            <p:ph type="ftr" sz="quarter" idx="11"/>
-          </p:nvPr>
-        </p:nvSpPr>
-        <p:spPr/>
-        <p:txBody>
-          <a:bodyPr/>
-          <a:lstStyle/>
-          <a:p>
-            <a:r>
-              <a:rPr lang="en-US"/>
-              <a:t>Megan Ball DS6390</a:t>
+              <a:rPr lang="en-US" sz="2800" dirty="0"/>
+              <a:t>But won’t increasing renewable sources lead to less reliability on the grid?</a:t>
+            </a:r>
+          </a:p>
+          <a:p>
+            <a:r>
+              <a:rPr lang="en-US" sz="2800" dirty="0"/>
+              <a:t>Areas of opportunity</a:t>
             </a:r>
           </a:p>
         </p:txBody>
@@ -4260,12 +4236,297 @@
   <p:clrMapOvr>
     <a:masterClrMapping/>
   </p:clrMapOvr>
+  <p:timing>
+    <p:tnLst>
+      <p:par>
+        <p:cTn id="1" dur="indefinite" restart="never" nodeType="tmRoot">
+          <p:childTnLst>
+            <p:seq concurrent="1" nextAc="seek">
+              <p:cTn id="2" dur="indefinite" nodeType="mainSeq">
+                <p:childTnLst>
+                  <p:par>
+                    <p:cTn id="3" fill="hold">
+                      <p:stCondLst>
+                        <p:cond delay="indefinite"/>
+                      </p:stCondLst>
+                      <p:childTnLst>
+                        <p:par>
+                          <p:cTn id="4" fill="hold">
+                            <p:stCondLst>
+                              <p:cond delay="0"/>
+                            </p:stCondLst>
+                            <p:childTnLst>
+                              <p:par>
+                                <p:cTn id="5" presetID="10" presetClass="entr" presetSubtype="0" fill="hold" grpId="0" nodeType="clickEffect">
+                                  <p:stCondLst>
+                                    <p:cond delay="0"/>
+                                  </p:stCondLst>
+                                  <p:childTnLst>
+                                    <p:set>
+                                      <p:cBhvr>
+                                        <p:cTn id="6" dur="1" fill="hold">
+                                          <p:stCondLst>
+                                            <p:cond delay="0"/>
+                                          </p:stCondLst>
+                                        </p:cTn>
+                                        <p:tgtEl>
+                                          <p:spTgt spid="3">
+                                            <p:txEl>
+                                              <p:pRg st="0" end="0"/>
+                                            </p:txEl>
+                                          </p:spTgt>
+                                        </p:tgtEl>
+                                        <p:attrNameLst>
+                                          <p:attrName>style.visibility</p:attrName>
+                                        </p:attrNameLst>
+                                      </p:cBhvr>
+                                      <p:to>
+                                        <p:strVal val="visible"/>
+                                      </p:to>
+                                    </p:set>
+                                    <p:animEffect transition="in" filter="fade">
+                                      <p:cBhvr>
+                                        <p:cTn id="7" dur="500"/>
+                                        <p:tgtEl>
+                                          <p:spTgt spid="3">
+                                            <p:txEl>
+                                              <p:pRg st="0" end="0"/>
+                                            </p:txEl>
+                                          </p:spTgt>
+                                        </p:tgtEl>
+                                      </p:cBhvr>
+                                    </p:animEffect>
+                                  </p:childTnLst>
+                                </p:cTn>
+                              </p:par>
+                            </p:childTnLst>
+                          </p:cTn>
+                        </p:par>
+                      </p:childTnLst>
+                    </p:cTn>
+                  </p:par>
+                  <p:par>
+                    <p:cTn id="8" fill="hold">
+                      <p:stCondLst>
+                        <p:cond delay="indefinite"/>
+                      </p:stCondLst>
+                      <p:childTnLst>
+                        <p:par>
+                          <p:cTn id="9" fill="hold">
+                            <p:stCondLst>
+                              <p:cond delay="0"/>
+                            </p:stCondLst>
+                            <p:childTnLst>
+                              <p:par>
+                                <p:cTn id="10" presetID="10" presetClass="entr" presetSubtype="0" fill="hold" grpId="0" nodeType="clickEffect">
+                                  <p:stCondLst>
+                                    <p:cond delay="0"/>
+                                  </p:stCondLst>
+                                  <p:childTnLst>
+                                    <p:set>
+                                      <p:cBhvr>
+                                        <p:cTn id="11" dur="1" fill="hold">
+                                          <p:stCondLst>
+                                            <p:cond delay="0"/>
+                                          </p:stCondLst>
+                                        </p:cTn>
+                                        <p:tgtEl>
+                                          <p:spTgt spid="3">
+                                            <p:txEl>
+                                              <p:pRg st="1" end="1"/>
+                                            </p:txEl>
+                                          </p:spTgt>
+                                        </p:tgtEl>
+                                        <p:attrNameLst>
+                                          <p:attrName>style.visibility</p:attrName>
+                                        </p:attrNameLst>
+                                      </p:cBhvr>
+                                      <p:to>
+                                        <p:strVal val="visible"/>
+                                      </p:to>
+                                    </p:set>
+                                    <p:animEffect transition="in" filter="fade">
+                                      <p:cBhvr>
+                                        <p:cTn id="12" dur="500"/>
+                                        <p:tgtEl>
+                                          <p:spTgt spid="3">
+                                            <p:txEl>
+                                              <p:pRg st="1" end="1"/>
+                                            </p:txEl>
+                                          </p:spTgt>
+                                        </p:tgtEl>
+                                      </p:cBhvr>
+                                    </p:animEffect>
+                                  </p:childTnLst>
+                                </p:cTn>
+                              </p:par>
+                            </p:childTnLst>
+                          </p:cTn>
+                        </p:par>
+                      </p:childTnLst>
+                    </p:cTn>
+                  </p:par>
+                  <p:par>
+                    <p:cTn id="13" fill="hold">
+                      <p:stCondLst>
+                        <p:cond delay="indefinite"/>
+                      </p:stCondLst>
+                      <p:childTnLst>
+                        <p:par>
+                          <p:cTn id="14" fill="hold">
+                            <p:stCondLst>
+                              <p:cond delay="0"/>
+                            </p:stCondLst>
+                            <p:childTnLst>
+                              <p:par>
+                                <p:cTn id="15" presetID="10" presetClass="entr" presetSubtype="0" fill="hold" grpId="0" nodeType="clickEffect">
+                                  <p:stCondLst>
+                                    <p:cond delay="0"/>
+                                  </p:stCondLst>
+                                  <p:childTnLst>
+                                    <p:set>
+                                      <p:cBhvr>
+                                        <p:cTn id="16" dur="1" fill="hold">
+                                          <p:stCondLst>
+                                            <p:cond delay="0"/>
+                                          </p:stCondLst>
+                                        </p:cTn>
+                                        <p:tgtEl>
+                                          <p:spTgt spid="3">
+                                            <p:txEl>
+                                              <p:pRg st="2" end="2"/>
+                                            </p:txEl>
+                                          </p:spTgt>
+                                        </p:tgtEl>
+                                        <p:attrNameLst>
+                                          <p:attrName>style.visibility</p:attrName>
+                                        </p:attrNameLst>
+                                      </p:cBhvr>
+                                      <p:to>
+                                        <p:strVal val="visible"/>
+                                      </p:to>
+                                    </p:set>
+                                    <p:animEffect transition="in" filter="fade">
+                                      <p:cBhvr>
+                                        <p:cTn id="17" dur="500"/>
+                                        <p:tgtEl>
+                                          <p:spTgt spid="3">
+                                            <p:txEl>
+                                              <p:pRg st="2" end="2"/>
+                                            </p:txEl>
+                                          </p:spTgt>
+                                        </p:tgtEl>
+                                      </p:cBhvr>
+                                    </p:animEffect>
+                                  </p:childTnLst>
+                                </p:cTn>
+                              </p:par>
+                            </p:childTnLst>
+                          </p:cTn>
+                        </p:par>
+                      </p:childTnLst>
+                    </p:cTn>
+                  </p:par>
+                  <p:par>
+                    <p:cTn id="18" fill="hold">
+                      <p:stCondLst>
+                        <p:cond delay="indefinite"/>
+                      </p:stCondLst>
+                      <p:childTnLst>
+                        <p:par>
+                          <p:cTn id="19" fill="hold">
+                            <p:stCondLst>
+                              <p:cond delay="0"/>
+                            </p:stCondLst>
+                            <p:childTnLst>
+                              <p:par>
+                                <p:cTn id="20" presetID="10" presetClass="entr" presetSubtype="0" fill="hold" grpId="0" nodeType="clickEffect">
+                                  <p:stCondLst>
+                                    <p:cond delay="0"/>
+                                  </p:stCondLst>
+                                  <p:childTnLst>
+                                    <p:set>
+                                      <p:cBhvr>
+                                        <p:cTn id="21" dur="1" fill="hold">
+                                          <p:stCondLst>
+                                            <p:cond delay="0"/>
+                                          </p:stCondLst>
+                                        </p:cTn>
+                                        <p:tgtEl>
+                                          <p:spTgt spid="3">
+                                            <p:txEl>
+                                              <p:pRg st="3" end="3"/>
+                                            </p:txEl>
+                                          </p:spTgt>
+                                        </p:tgtEl>
+                                        <p:attrNameLst>
+                                          <p:attrName>style.visibility</p:attrName>
+                                        </p:attrNameLst>
+                                      </p:cBhvr>
+                                      <p:to>
+                                        <p:strVal val="visible"/>
+                                      </p:to>
+                                    </p:set>
+                                    <p:animEffect transition="in" filter="fade">
+                                      <p:cBhvr>
+                                        <p:cTn id="22" dur="500"/>
+                                        <p:tgtEl>
+                                          <p:spTgt spid="3">
+                                            <p:txEl>
+                                              <p:pRg st="3" end="3"/>
+                                            </p:txEl>
+                                          </p:spTgt>
+                                        </p:tgtEl>
+                                      </p:cBhvr>
+                                    </p:animEffect>
+                                  </p:childTnLst>
+                                </p:cTn>
+                              </p:par>
+                            </p:childTnLst>
+                          </p:cTn>
+                        </p:par>
+                      </p:childTnLst>
+                    </p:cTn>
+                  </p:par>
+                </p:childTnLst>
+              </p:cTn>
+              <p:prevCondLst>
+                <p:cond evt="onPrev" delay="0">
+                  <p:tgtEl>
+                    <p:sldTgt/>
+                  </p:tgtEl>
+                </p:cond>
+              </p:prevCondLst>
+              <p:nextCondLst>
+                <p:cond evt="onNext" delay="0">
+                  <p:tgtEl>
+                    <p:sldTgt/>
+                  </p:tgtEl>
+                </p:cond>
+              </p:nextCondLst>
+            </p:seq>
+          </p:childTnLst>
+        </p:cTn>
+      </p:par>
+    </p:tnLst>
+    <p:bldLst>
+      <p:bldP spid="3" grpId="0" build="p"/>
+    </p:bldLst>
+  </p:timing>
 </p:sld>
 </file>
 
 <file path=ppt/slides/slide3.xml><?xml version="1.0" encoding="utf-8"?>
 <p:sld xmlns:a="http://schemas.openxmlformats.org/drawingml/2006/main" xmlns:r="http://schemas.openxmlformats.org/officeDocument/2006/relationships" xmlns:p="http://schemas.openxmlformats.org/presentationml/2006/main">
   <p:cSld>
+    <p:bg>
+      <p:bgPr>
+        <a:solidFill>
+          <a:schemeClr val="bg1"/>
+        </a:solidFill>
+        <a:effectLst/>
+      </p:bgPr>
+    </p:bg>
     <p:spTree>
       <p:nvGrpSpPr>
         <p:cNvPr id="1" name=""/>
@@ -4282,6 +4543,53 @@
       </p:grpSpPr>
       <p:sp>
         <p:nvSpPr>
+          <p:cNvPr id="12" name="Rectangle 11">
+            <a:extLst>
+              <a:ext uri="{FF2B5EF4-FFF2-40B4-BE49-F238E27FC236}">
+                <a16:creationId xmlns:a16="http://schemas.microsoft.com/office/drawing/2014/main" id="{E6A308B2-15D9-46EE-ACE4-47721D816925}"/>
+              </a:ext>
+            </a:extLst>
+          </p:cNvPr>
+          <p:cNvSpPr/>
+          <p:nvPr/>
+        </p:nvSpPr>
+        <p:spPr>
+          <a:xfrm>
+            <a:off x="8337755" y="0"/>
+            <a:ext cx="3854245" cy="6858000"/>
+          </a:xfrm>
+          <a:prstGeom prst="rect">
+            <a:avLst/>
+          </a:prstGeom>
+          <a:ln>
+            <a:noFill/>
+          </a:ln>
+        </p:spPr>
+        <p:style>
+          <a:lnRef idx="3">
+            <a:schemeClr val="lt1"/>
+          </a:lnRef>
+          <a:fillRef idx="1">
+            <a:schemeClr val="accent1"/>
+          </a:fillRef>
+          <a:effectRef idx="1">
+            <a:schemeClr val="accent1"/>
+          </a:effectRef>
+          <a:fontRef idx="minor">
+            <a:schemeClr val="lt1"/>
+          </a:fontRef>
+        </p:style>
+        <p:txBody>
+          <a:bodyPr rtlCol="0" anchor="ctr"/>
+          <a:lstStyle/>
+          <a:p>
+            <a:pPr algn="ctr"/>
+            <a:endParaRPr lang="en-US"/>
+          </a:p>
+        </p:txBody>
+      </p:sp>
+      <p:sp>
+        <p:nvSpPr>
           <p:cNvPr id="2" name="Title 1">
             <a:extLst>
               <a:ext uri="{FF2B5EF4-FFF2-40B4-BE49-F238E27FC236}">
@@ -4293,16 +4601,27 @@
             <a:spLocks noGrp="1"/>
           </p:cNvSpPr>
           <p:nvPr>
-            <p:ph type="title"/>
-          </p:nvPr>
-        </p:nvSpPr>
-        <p:spPr/>
-        <p:txBody>
-          <a:bodyPr/>
+            <p:ph type="title" idx="4294967295"/>
+          </p:nvPr>
+        </p:nvSpPr>
+        <p:spPr>
+          <a:xfrm>
+            <a:off x="8829938" y="1765626"/>
+            <a:ext cx="3402012" cy="1919287"/>
+          </a:xfrm>
+        </p:spPr>
+        <p:txBody>
+          <a:bodyPr anchor="b">
+            <a:normAutofit/>
+          </a:bodyPr>
           <a:lstStyle/>
           <a:p>
             <a:r>
-              <a:rPr lang="en-US" dirty="0"/>
+              <a:rPr lang="en-US" sz="4000" dirty="0">
+                <a:solidFill>
+                  <a:srgbClr val="FFFFFF"/>
+                </a:solidFill>
+              </a:rPr>
               <a:t>State of the Union’s Emissions</a:t>
             </a:r>
           </a:p>
@@ -4310,57 +4629,297 @@
       </p:sp>
       <p:sp>
         <p:nvSpPr>
-          <p:cNvPr id="3" name="Content Placeholder 2">
+          <p:cNvPr id="7" name="TextBox 6">
             <a:extLst>
               <a:ext uri="{FF2B5EF4-FFF2-40B4-BE49-F238E27FC236}">
-                <a16:creationId xmlns:a16="http://schemas.microsoft.com/office/drawing/2014/main" id="{A312A061-7570-4330-96AB-D89BD92F7A4F}"/>
+                <a16:creationId xmlns:a16="http://schemas.microsoft.com/office/drawing/2014/main" id="{5913B0AA-68B7-4962-8CEF-18E035FEA703}"/>
               </a:ext>
             </a:extLst>
           </p:cNvPr>
-          <p:cNvSpPr>
-            <a:spLocks noGrp="1"/>
-          </p:cNvSpPr>
-          <p:nvPr>
-            <p:ph idx="1"/>
-          </p:nvPr>
-        </p:nvSpPr>
-        <p:spPr/>
-        <p:txBody>
-          <a:bodyPr/>
+          <p:cNvSpPr txBox="1"/>
+          <p:nvPr/>
+        </p:nvSpPr>
+        <p:spPr>
+          <a:xfrm>
+            <a:off x="257828" y="5425487"/>
+            <a:ext cx="8000028" cy="954107"/>
+          </a:xfrm>
+          <a:prstGeom prst="rect">
+            <a:avLst/>
+          </a:prstGeom>
+          <a:noFill/>
+        </p:spPr>
+        <p:txBody>
+          <a:bodyPr wrap="square" rtlCol="0">
+            <a:spAutoFit/>
+          </a:bodyPr>
           <a:lstStyle/>
           <a:p>
-            <a:endParaRPr lang="en-US"/>
-          </a:p>
-        </p:txBody>
-      </p:sp>
-      <p:sp>
-        <p:nvSpPr>
-          <p:cNvPr id="4" name="Footer Placeholder 3">
+            <a:r>
+              <a:rPr lang="en-US" dirty="0"/>
+              <a:t>The US leads in greenhouse gas emissions at a per capita level compared to most of Europe. In 2016, the United States total greenhouse gas emissions were </a:t>
+            </a:r>
+            <a:r>
+              <a:rPr lang="en-US" sz="2000" b="1" dirty="0">
+                <a:solidFill>
+                  <a:srgbClr val="C00000"/>
+                </a:solidFill>
+              </a:rPr>
+              <a:t>2 times </a:t>
+            </a:r>
+            <a:r>
+              <a:rPr lang="en-US" dirty="0"/>
+              <a:t>the average of the European countries listed above. </a:t>
+            </a:r>
+          </a:p>
+        </p:txBody>
+      </p:sp>
+      <p:pic>
+        <p:nvPicPr>
+          <p:cNvPr id="5" name="Picture 4" descr="Chart&#10;&#10;Description automatically generated">
             <a:extLst>
               <a:ext uri="{FF2B5EF4-FFF2-40B4-BE49-F238E27FC236}">
-                <a16:creationId xmlns:a16="http://schemas.microsoft.com/office/drawing/2014/main" id="{03A27CC9-A734-444B-AA23-5E666B562E39}"/>
+                <a16:creationId xmlns:a16="http://schemas.microsoft.com/office/drawing/2014/main" id="{2F6A4DB8-2927-4BDE-888C-B95C47E28666}"/>
               </a:ext>
             </a:extLst>
           </p:cNvPr>
-          <p:cNvSpPr>
-            <a:spLocks noGrp="1"/>
-          </p:cNvSpPr>
-          <p:nvPr>
-            <p:ph type="ftr" sz="quarter" idx="11"/>
-          </p:nvPr>
-        </p:nvSpPr>
-        <p:spPr/>
-        <p:txBody>
-          <a:bodyPr/>
+          <p:cNvPicPr>
+            <a:picLocks noChangeAspect="1"/>
+          </p:cNvPicPr>
+          <p:nvPr/>
+        </p:nvPicPr>
+        <p:blipFill>
+          <a:blip r:embed="rId2">
+            <a:extLst>
+              <a:ext uri="{28A0092B-C50C-407E-A947-70E740481C1C}">
+                <a14:useLocalDpi xmlns:a14="http://schemas.microsoft.com/office/drawing/2010/main" val="0"/>
+              </a:ext>
+            </a:extLst>
+          </a:blip>
+          <a:stretch>
+            <a:fillRect/>
+          </a:stretch>
+        </p:blipFill>
+        <p:spPr>
+          <a:xfrm>
+            <a:off x="257828" y="284989"/>
+            <a:ext cx="6377668" cy="4880562"/>
+          </a:xfrm>
+          <a:prstGeom prst="rect">
+            <a:avLst/>
+          </a:prstGeom>
+        </p:spPr>
+      </p:pic>
+      <p:sp>
+        <p:nvSpPr>
+          <p:cNvPr id="8" name="TextBox 7">
+            <a:extLst>
+              <a:ext uri="{FF2B5EF4-FFF2-40B4-BE49-F238E27FC236}">
+                <a16:creationId xmlns:a16="http://schemas.microsoft.com/office/drawing/2014/main" id="{BF24AB74-065C-41EA-8D9F-259F1135FAF7}"/>
+              </a:ext>
+            </a:extLst>
+          </p:cNvPr>
+          <p:cNvSpPr txBox="1"/>
+          <p:nvPr/>
+        </p:nvSpPr>
+        <p:spPr>
+          <a:xfrm>
+            <a:off x="5714999" y="166191"/>
+            <a:ext cx="2496845" cy="830997"/>
+          </a:xfrm>
+          <a:prstGeom prst="rect">
+            <a:avLst/>
+          </a:prstGeom>
+        </p:spPr>
+        <p:style>
+          <a:lnRef idx="2">
+            <a:schemeClr val="dk1"/>
+          </a:lnRef>
+          <a:fillRef idx="1">
+            <a:schemeClr val="lt1"/>
+          </a:fillRef>
+          <a:effectRef idx="0">
+            <a:schemeClr val="dk1"/>
+          </a:effectRef>
+          <a:fontRef idx="minor">
+            <a:schemeClr val="dk1"/>
+          </a:fontRef>
+        </p:style>
+        <p:txBody>
+          <a:bodyPr wrap="square" rtlCol="0">
+            <a:spAutoFit/>
+          </a:bodyPr>
           <a:lstStyle/>
           <a:p>
-            <a:r>
-              <a:rPr lang="en-US"/>
-              <a:t>Megan Ball DS6390</a:t>
-            </a:r>
-          </a:p>
-        </p:txBody>
-      </p:sp>
+            <a:pPr algn="ctr"/>
+            <a:r>
+              <a:rPr lang="en-US" sz="1600" dirty="0"/>
+              <a:t>The US  emitted </a:t>
+            </a:r>
+            <a:r>
+              <a:rPr lang="en-US" sz="1600" b="1" dirty="0"/>
+              <a:t>18 tons </a:t>
+            </a:r>
+            <a:r>
+              <a:rPr lang="en-US" sz="1600" dirty="0"/>
+              <a:t>of CO</a:t>
+            </a:r>
+            <a:r>
+              <a:rPr lang="en-US" sz="1600" baseline="-25000" dirty="0"/>
+              <a:t>2 </a:t>
+            </a:r>
+            <a:r>
+              <a:rPr lang="en-US" sz="1600" dirty="0"/>
+              <a:t>equivalents per capita in 2016</a:t>
+            </a:r>
+          </a:p>
+        </p:txBody>
+      </p:sp>
+      <p:cxnSp>
+        <p:nvCxnSpPr>
+          <p:cNvPr id="11" name="Straight Connector 10">
+            <a:extLst>
+              <a:ext uri="{FF2B5EF4-FFF2-40B4-BE49-F238E27FC236}">
+                <a16:creationId xmlns:a16="http://schemas.microsoft.com/office/drawing/2014/main" id="{7689B979-A588-431C-8CB8-F872AD2395C9}"/>
+              </a:ext>
+            </a:extLst>
+          </p:cNvPr>
+          <p:cNvCxnSpPr>
+            <a:cxnSpLocks/>
+            <a:endCxn id="8" idx="1"/>
+          </p:cNvCxnSpPr>
+          <p:nvPr/>
+        </p:nvCxnSpPr>
+        <p:spPr>
+          <a:xfrm>
+            <a:off x="5175682" y="426128"/>
+            <a:ext cx="539317" cy="155562"/>
+          </a:xfrm>
+          <a:prstGeom prst="line">
+            <a:avLst/>
+          </a:prstGeom>
+          <a:ln w="19050"/>
+        </p:spPr>
+        <p:style>
+          <a:lnRef idx="1">
+            <a:schemeClr val="dk1"/>
+          </a:lnRef>
+          <a:fillRef idx="0">
+            <a:schemeClr val="dk1"/>
+          </a:fillRef>
+          <a:effectRef idx="0">
+            <a:schemeClr val="dk1"/>
+          </a:effectRef>
+          <a:fontRef idx="minor">
+            <a:schemeClr val="tx1"/>
+          </a:fontRef>
+        </p:style>
+      </p:cxnSp>
+      <p:sp>
+        <p:nvSpPr>
+          <p:cNvPr id="18" name="TextBox 17">
+            <a:extLst>
+              <a:ext uri="{FF2B5EF4-FFF2-40B4-BE49-F238E27FC236}">
+                <a16:creationId xmlns:a16="http://schemas.microsoft.com/office/drawing/2014/main" id="{EFEA9E87-1881-44E4-B0DF-433FAA16E449}"/>
+              </a:ext>
+            </a:extLst>
+          </p:cNvPr>
+          <p:cNvSpPr txBox="1"/>
+          <p:nvPr/>
+        </p:nvSpPr>
+        <p:spPr>
+          <a:xfrm>
+            <a:off x="4529532" y="3621084"/>
+            <a:ext cx="2496845" cy="830997"/>
+          </a:xfrm>
+          <a:prstGeom prst="rect">
+            <a:avLst/>
+          </a:prstGeom>
+        </p:spPr>
+        <p:style>
+          <a:lnRef idx="2">
+            <a:schemeClr val="dk1"/>
+          </a:lnRef>
+          <a:fillRef idx="1">
+            <a:schemeClr val="lt1"/>
+          </a:fillRef>
+          <a:effectRef idx="0">
+            <a:schemeClr val="dk1"/>
+          </a:effectRef>
+          <a:fontRef idx="minor">
+            <a:schemeClr val="dk1"/>
+          </a:fontRef>
+        </p:style>
+        <p:txBody>
+          <a:bodyPr wrap="square" rtlCol="0">
+            <a:spAutoFit/>
+          </a:bodyPr>
+          <a:lstStyle/>
+          <a:p>
+            <a:pPr algn="ctr"/>
+            <a:r>
+              <a:rPr lang="en-US" sz="1600" dirty="0"/>
+              <a:t>France emitted </a:t>
+            </a:r>
+            <a:r>
+              <a:rPr lang="en-US" sz="1600" b="1" dirty="0"/>
+              <a:t>5 tons </a:t>
+            </a:r>
+            <a:r>
+              <a:rPr lang="en-US" sz="1600" dirty="0"/>
+              <a:t>of CO</a:t>
+            </a:r>
+            <a:r>
+              <a:rPr lang="en-US" sz="1600" baseline="-25000" dirty="0"/>
+              <a:t>2 </a:t>
+            </a:r>
+            <a:r>
+              <a:rPr lang="en-US" sz="1600" dirty="0"/>
+              <a:t>equivalents per capita in 2016</a:t>
+            </a:r>
+          </a:p>
+        </p:txBody>
+      </p:sp>
+      <p:cxnSp>
+        <p:nvCxnSpPr>
+          <p:cNvPr id="19" name="Straight Connector 18">
+            <a:extLst>
+              <a:ext uri="{FF2B5EF4-FFF2-40B4-BE49-F238E27FC236}">
+                <a16:creationId xmlns:a16="http://schemas.microsoft.com/office/drawing/2014/main" id="{45E9D90A-936D-4375-8C10-6FB7E23D4F45}"/>
+              </a:ext>
+            </a:extLst>
+          </p:cNvPr>
+          <p:cNvCxnSpPr>
+            <a:cxnSpLocks/>
+            <a:endCxn id="18" idx="1"/>
+          </p:cNvCxnSpPr>
+          <p:nvPr/>
+        </p:nvCxnSpPr>
+        <p:spPr>
+          <a:xfrm>
+            <a:off x="3441925" y="3881020"/>
+            <a:ext cx="1087607" cy="155563"/>
+          </a:xfrm>
+          <a:prstGeom prst="line">
+            <a:avLst/>
+          </a:prstGeom>
+          <a:ln w="19050"/>
+        </p:spPr>
+        <p:style>
+          <a:lnRef idx="1">
+            <a:schemeClr val="dk1"/>
+          </a:lnRef>
+          <a:fillRef idx="0">
+            <a:schemeClr val="dk1"/>
+          </a:fillRef>
+          <a:effectRef idx="0">
+            <a:schemeClr val="dk1"/>
+          </a:effectRef>
+          <a:fontRef idx="minor">
+            <a:schemeClr val="tx1"/>
+          </a:fontRef>
+        </p:style>
+      </p:cxnSp>
     </p:spTree>
     <p:extLst>
       <p:ext uri="{BB962C8B-B14F-4D97-AF65-F5344CB8AC3E}">
@@ -4391,12 +4950,195 @@
           <a:chExt cx="0" cy="0"/>
         </a:xfrm>
       </p:grpSpPr>
+      <p:sp>
+        <p:nvSpPr>
+          <p:cNvPr id="5" name="Title 4">
+            <a:extLst>
+              <a:ext uri="{FF2B5EF4-FFF2-40B4-BE49-F238E27FC236}">
+                <a16:creationId xmlns:a16="http://schemas.microsoft.com/office/drawing/2014/main" id="{7B57C69B-2677-46B2-9D86-26AD0681B27D}"/>
+              </a:ext>
+            </a:extLst>
+          </p:cNvPr>
+          <p:cNvSpPr>
+            <a:spLocks noGrp="1"/>
+          </p:cNvSpPr>
+          <p:nvPr>
+            <p:ph type="title"/>
+          </p:nvPr>
+        </p:nvSpPr>
+        <p:spPr>
+          <a:xfrm>
+            <a:off x="676655" y="5309935"/>
+            <a:ext cx="10780776" cy="613283"/>
+          </a:xfrm>
+        </p:spPr>
+        <p:txBody>
+          <a:bodyPr/>
+          <a:lstStyle/>
+          <a:p>
+            <a:r>
+              <a:rPr lang="en-US" dirty="0"/>
+              <a:t>The US falls behind in renewable energy</a:t>
+            </a:r>
+          </a:p>
+        </p:txBody>
+      </p:sp>
+      <p:sp>
+        <p:nvSpPr>
+          <p:cNvPr id="9" name="Rectangle 8">
+            <a:extLst>
+              <a:ext uri="{FF2B5EF4-FFF2-40B4-BE49-F238E27FC236}">
+                <a16:creationId xmlns:a16="http://schemas.microsoft.com/office/drawing/2014/main" id="{A34C6796-C102-4C1F-B967-8FF129C3ABDD}"/>
+              </a:ext>
+            </a:extLst>
+          </p:cNvPr>
+          <p:cNvSpPr/>
+          <p:nvPr/>
+        </p:nvSpPr>
+        <p:spPr>
+          <a:xfrm>
+            <a:off x="0" y="0"/>
+            <a:ext cx="12192000" cy="5307105"/>
+          </a:xfrm>
+          <a:prstGeom prst="rect">
+            <a:avLst/>
+          </a:prstGeom>
+          <a:ln>
+            <a:noFill/>
+          </a:ln>
+        </p:spPr>
+        <p:style>
+          <a:lnRef idx="2">
+            <a:schemeClr val="dk1"/>
+          </a:lnRef>
+          <a:fillRef idx="1">
+            <a:schemeClr val="lt1"/>
+          </a:fillRef>
+          <a:effectRef idx="0">
+            <a:schemeClr val="dk1"/>
+          </a:effectRef>
+          <a:fontRef idx="minor">
+            <a:schemeClr val="dk1"/>
+          </a:fontRef>
+        </p:style>
+        <p:txBody>
+          <a:bodyPr rtlCol="0" anchor="ctr"/>
+          <a:lstStyle/>
+          <a:p>
+            <a:pPr algn="ctr"/>
+            <a:endParaRPr lang="en-US"/>
+          </a:p>
+        </p:txBody>
+      </p:sp>
+      <p:sp>
+        <p:nvSpPr>
+          <p:cNvPr id="7" name="Text Placeholder 6">
+            <a:extLst>
+              <a:ext uri="{FF2B5EF4-FFF2-40B4-BE49-F238E27FC236}">
+                <a16:creationId xmlns:a16="http://schemas.microsoft.com/office/drawing/2014/main" id="{298E32CF-628F-4635-8B77-ED5583F700CA}"/>
+              </a:ext>
+            </a:extLst>
+          </p:cNvPr>
+          <p:cNvSpPr>
+            <a:spLocks noGrp="1"/>
+          </p:cNvSpPr>
+          <p:nvPr>
+            <p:ph type="body" sz="half" idx="2"/>
+          </p:nvPr>
+        </p:nvSpPr>
+        <p:spPr>
+          <a:xfrm>
+            <a:off x="676655" y="5909735"/>
+            <a:ext cx="10589108" cy="873562"/>
+          </a:xfrm>
+        </p:spPr>
+        <p:txBody>
+          <a:bodyPr>
+            <a:normAutofit/>
+          </a:bodyPr>
+          <a:lstStyle/>
+          <a:p>
+            <a:r>
+              <a:rPr lang="en-US" sz="1800" dirty="0">
+                <a:solidFill>
+                  <a:schemeClr val="bg1"/>
+                </a:solidFill>
+              </a:rPr>
+              <a:t>From the years 2000 to 2015, the US increased the amount of energy it generates from renewable sources from </a:t>
+            </a:r>
+            <a:r>
+              <a:rPr lang="en-US" sz="2000" b="1" dirty="0">
+                <a:solidFill>
+                  <a:schemeClr val="bg1"/>
+                </a:solidFill>
+              </a:rPr>
+              <a:t>8.2% </a:t>
+            </a:r>
+            <a:r>
+              <a:rPr lang="en-US" sz="1800" dirty="0">
+                <a:solidFill>
+                  <a:schemeClr val="bg1"/>
+                </a:solidFill>
+              </a:rPr>
+              <a:t>to only </a:t>
+            </a:r>
+            <a:r>
+              <a:rPr lang="en-US" sz="2000" b="1" dirty="0">
+                <a:solidFill>
+                  <a:schemeClr val="bg1"/>
+                </a:solidFill>
+              </a:rPr>
+              <a:t>13.2%. </a:t>
+            </a:r>
+            <a:r>
+              <a:rPr lang="en-US" sz="1800" dirty="0">
+                <a:solidFill>
+                  <a:schemeClr val="bg1"/>
+                </a:solidFill>
+              </a:rPr>
+              <a:t>In contrast, Germany increased their renewable portion from </a:t>
+            </a:r>
+            <a:r>
+              <a:rPr lang="en-US" sz="1800" b="1" dirty="0">
+                <a:solidFill>
+                  <a:schemeClr val="bg1"/>
+                </a:solidFill>
+              </a:rPr>
+              <a:t>6.2% </a:t>
+            </a:r>
+            <a:r>
+              <a:rPr lang="en-US" sz="1800" dirty="0">
+                <a:solidFill>
+                  <a:schemeClr val="bg1"/>
+                </a:solidFill>
+              </a:rPr>
+              <a:t>to </a:t>
+            </a:r>
+            <a:r>
+              <a:rPr lang="en-US" sz="1800" b="1" dirty="0">
+                <a:solidFill>
+                  <a:schemeClr val="bg1"/>
+                </a:solidFill>
+              </a:rPr>
+              <a:t>29.2% </a:t>
+            </a:r>
+            <a:r>
+              <a:rPr lang="en-US" sz="1800" dirty="0">
+                <a:solidFill>
+                  <a:schemeClr val="bg1"/>
+                </a:solidFill>
+              </a:rPr>
+              <a:t>- an increase of  almost 300%!</a:t>
+            </a:r>
+          </a:p>
+        </p:txBody>
+      </p:sp>
       <p:pic>
         <p:nvPicPr>
-          <p:cNvPr id="6" name="Picture 5">
+          <p:cNvPr id="8" name="Picture 7" descr="Chart, line chart&#10;&#10;Description automatically generated">
             <a:extLst>
               <a:ext uri="{FF2B5EF4-FFF2-40B4-BE49-F238E27FC236}">
-                <a16:creationId xmlns:a16="http://schemas.microsoft.com/office/drawing/2014/main" id="{301BE354-896C-48A2-AC04-EBE0E152DCEE}"/>
+                <a16:creationId xmlns:a16="http://schemas.microsoft.com/office/drawing/2014/main" id="{EDE553D1-3972-49C2-9E30-58959249E9D2}"/>
               </a:ext>
             </a:extLst>
           </p:cNvPr>
@@ -4406,15 +5148,21 @@
           <p:nvPr/>
         </p:nvPicPr>
         <p:blipFill>
-          <a:blip r:embed="rId2"/>
+          <a:blip r:embed="rId2">
+            <a:extLst>
+              <a:ext uri="{28A0092B-C50C-407E-A947-70E740481C1C}">
+                <a14:useLocalDpi xmlns:a14="http://schemas.microsoft.com/office/drawing/2010/main" val="0"/>
+              </a:ext>
+            </a:extLst>
+          </a:blip>
           <a:stretch>
             <a:fillRect/>
           </a:stretch>
         </p:blipFill>
         <p:spPr>
           <a:xfrm>
-            <a:off x="259396" y="1229072"/>
-            <a:ext cx="5357324" cy="4084674"/>
+            <a:off x="2748325" y="74703"/>
+            <a:ext cx="6695349" cy="5123670"/>
           </a:xfrm>
           <a:prstGeom prst="rect">
             <a:avLst/>
@@ -4423,45 +5171,10 @@
       </p:pic>
       <p:sp>
         <p:nvSpPr>
-          <p:cNvPr id="4" name="Title 3">
+          <p:cNvPr id="10" name="TextBox 9">
             <a:extLst>
               <a:ext uri="{FF2B5EF4-FFF2-40B4-BE49-F238E27FC236}">
-                <a16:creationId xmlns:a16="http://schemas.microsoft.com/office/drawing/2014/main" id="{B83E91D0-5768-41EE-8A76-9BF94BAC5D5E}"/>
-              </a:ext>
-            </a:extLst>
-          </p:cNvPr>
-          <p:cNvSpPr>
-            <a:spLocks noGrp="1"/>
-          </p:cNvSpPr>
-          <p:nvPr>
-            <p:ph type="title"/>
-          </p:nvPr>
-        </p:nvSpPr>
-        <p:spPr>
-          <a:xfrm>
-            <a:off x="259396" y="237189"/>
-            <a:ext cx="9692640" cy="838200"/>
-          </a:xfrm>
-        </p:spPr>
-        <p:txBody>
-          <a:bodyPr>
-            <a:normAutofit fontScale="90000"/>
-          </a:bodyPr>
-          <a:lstStyle/>
-          <a:p>
-            <a:r>
-              <a:rPr lang="en-US" dirty="0"/>
-              <a:t>The US falls behind in renewable energy</a:t>
-            </a:r>
-          </a:p>
-        </p:txBody>
-      </p:sp>
-      <p:sp>
-        <p:nvSpPr>
-          <p:cNvPr id="11" name="TextBox 10">
-            <a:extLst>
-              <a:ext uri="{FF2B5EF4-FFF2-40B4-BE49-F238E27FC236}">
-                <a16:creationId xmlns:a16="http://schemas.microsoft.com/office/drawing/2014/main" id="{8BB3C4B4-D363-4D7C-A1BE-336E507B75BB}"/>
+                <a16:creationId xmlns:a16="http://schemas.microsoft.com/office/drawing/2014/main" id="{E1DF59CE-9332-4474-9A4F-3A8358D352BC}"/>
               </a:ext>
             </a:extLst>
           </p:cNvPr>
@@ -4470,8 +5183,8 @@
         </p:nvSpPr>
         <p:spPr>
           <a:xfrm>
-            <a:off x="5020537" y="3481626"/>
-            <a:ext cx="606524" cy="230832"/>
+            <a:off x="62145" y="4986597"/>
+            <a:ext cx="861134" cy="307777"/>
           </a:xfrm>
           <a:prstGeom prst="rect">
             <a:avLst/>
@@ -4485,353 +5198,16 @@
           <a:lstStyle/>
           <a:p>
             <a:r>
-              <a:rPr lang="en-US" sz="900" dirty="0">
-                <a:solidFill>
-                  <a:srgbClr val="A6A6A6"/>
-                </a:solidFill>
-                <a:latin typeface="Arial" panose="020B0604020202020204" pitchFamily="34" charset="0"/>
-                <a:cs typeface="Arial" panose="020B0604020202020204" pitchFamily="34" charset="0"/>
-              </a:rPr>
-              <a:t>France</a:t>
-            </a:r>
-          </a:p>
-        </p:txBody>
-      </p:sp>
-      <p:sp>
-        <p:nvSpPr>
-          <p:cNvPr id="12" name="TextBox 11">
-            <a:extLst>
-              <a:ext uri="{FF2B5EF4-FFF2-40B4-BE49-F238E27FC236}">
-                <a16:creationId xmlns:a16="http://schemas.microsoft.com/office/drawing/2014/main" id="{076161D6-BE30-4779-80B5-67745C3F0E55}"/>
-              </a:ext>
-            </a:extLst>
-          </p:cNvPr>
-          <p:cNvSpPr txBox="1"/>
-          <p:nvPr/>
-        </p:nvSpPr>
-        <p:spPr>
-          <a:xfrm>
-            <a:off x="5075106" y="3874980"/>
-            <a:ext cx="365126" cy="230832"/>
-          </a:xfrm>
-          <a:prstGeom prst="rect">
-            <a:avLst/>
-          </a:prstGeom>
-          <a:noFill/>
-        </p:spPr>
-        <p:txBody>
-          <a:bodyPr wrap="square" rtlCol="0">
-            <a:spAutoFit/>
-          </a:bodyPr>
-          <a:lstStyle/>
-          <a:p>
-            <a:r>
-              <a:rPr lang="en-US" sz="900" dirty="0">
-                <a:solidFill>
-                  <a:srgbClr val="005E94"/>
-                </a:solidFill>
-                <a:latin typeface="Arial" panose="020B0604020202020204" pitchFamily="34" charset="0"/>
-                <a:cs typeface="Arial" panose="020B0604020202020204" pitchFamily="34" charset="0"/>
-              </a:rPr>
-              <a:t>US</a:t>
-            </a:r>
-          </a:p>
-        </p:txBody>
-      </p:sp>
-      <p:sp>
-        <p:nvSpPr>
-          <p:cNvPr id="15" name="TextBox 14">
-            <a:extLst>
-              <a:ext uri="{FF2B5EF4-FFF2-40B4-BE49-F238E27FC236}">
-                <a16:creationId xmlns:a16="http://schemas.microsoft.com/office/drawing/2014/main" id="{8509B53D-EB47-492E-A4BF-D48D6B687D87}"/>
-              </a:ext>
-            </a:extLst>
-          </p:cNvPr>
-          <p:cNvSpPr txBox="1"/>
-          <p:nvPr/>
-        </p:nvSpPr>
-        <p:spPr>
-          <a:xfrm>
-            <a:off x="5075106" y="2314536"/>
-            <a:ext cx="606524" cy="230832"/>
-          </a:xfrm>
-          <a:prstGeom prst="rect">
-            <a:avLst/>
-          </a:prstGeom>
-          <a:noFill/>
-        </p:spPr>
-        <p:txBody>
-          <a:bodyPr wrap="square" rtlCol="0">
-            <a:spAutoFit/>
-          </a:bodyPr>
-          <a:lstStyle/>
-          <a:p>
-            <a:r>
-              <a:rPr lang="en-US" sz="900" dirty="0">
-                <a:solidFill>
-                  <a:srgbClr val="A6A6A6"/>
-                </a:solidFill>
-                <a:latin typeface="Arial" panose="020B0604020202020204" pitchFamily="34" charset="0"/>
-                <a:cs typeface="Arial" panose="020B0604020202020204" pitchFamily="34" charset="0"/>
-              </a:rPr>
-              <a:t>UK</a:t>
-            </a:r>
-          </a:p>
-        </p:txBody>
-      </p:sp>
-      <p:sp>
-        <p:nvSpPr>
-          <p:cNvPr id="16" name="TextBox 15">
-            <a:extLst>
-              <a:ext uri="{FF2B5EF4-FFF2-40B4-BE49-F238E27FC236}">
-                <a16:creationId xmlns:a16="http://schemas.microsoft.com/office/drawing/2014/main" id="{420F68F4-7422-4235-A957-B055F0B3E861}"/>
-              </a:ext>
-            </a:extLst>
-          </p:cNvPr>
-          <p:cNvSpPr txBox="1"/>
-          <p:nvPr/>
-        </p:nvSpPr>
-        <p:spPr>
-          <a:xfrm>
-            <a:off x="5037816" y="1870084"/>
-            <a:ext cx="606524" cy="230832"/>
-          </a:xfrm>
-          <a:prstGeom prst="rect">
-            <a:avLst/>
-          </a:prstGeom>
-          <a:noFill/>
-        </p:spPr>
-        <p:txBody>
-          <a:bodyPr wrap="square" rtlCol="0">
-            <a:spAutoFit/>
-          </a:bodyPr>
-          <a:lstStyle/>
-          <a:p>
-            <a:r>
-              <a:rPr lang="en-US" sz="900" dirty="0">
-                <a:solidFill>
-                  <a:srgbClr val="A6A6A6"/>
-                </a:solidFill>
-                <a:latin typeface="Arial" panose="020B0604020202020204" pitchFamily="34" charset="0"/>
-                <a:cs typeface="Arial" panose="020B0604020202020204" pitchFamily="34" charset="0"/>
-              </a:rPr>
-              <a:t>Ireland</a:t>
-            </a:r>
-          </a:p>
-        </p:txBody>
-      </p:sp>
-      <p:sp>
-        <p:nvSpPr>
-          <p:cNvPr id="17" name="TextBox 16">
-            <a:extLst>
-              <a:ext uri="{FF2B5EF4-FFF2-40B4-BE49-F238E27FC236}">
-                <a16:creationId xmlns:a16="http://schemas.microsoft.com/office/drawing/2014/main" id="{89D82084-2E18-4D6E-9A19-71A35028ACC7}"/>
-              </a:ext>
-            </a:extLst>
-          </p:cNvPr>
-          <p:cNvSpPr txBox="1"/>
-          <p:nvPr/>
-        </p:nvSpPr>
-        <p:spPr>
-          <a:xfrm>
-            <a:off x="5037815" y="1662013"/>
-            <a:ext cx="803691" cy="230832"/>
-          </a:xfrm>
-          <a:prstGeom prst="rect">
-            <a:avLst/>
-          </a:prstGeom>
-          <a:noFill/>
-        </p:spPr>
-        <p:txBody>
-          <a:bodyPr wrap="square" rtlCol="0">
-            <a:spAutoFit/>
-          </a:bodyPr>
-          <a:lstStyle/>
-          <a:p>
-            <a:r>
-              <a:rPr lang="en-US" sz="900" dirty="0">
-                <a:solidFill>
-                  <a:srgbClr val="A6A6A6"/>
-                </a:solidFill>
-                <a:latin typeface="Arial" panose="020B0604020202020204" pitchFamily="34" charset="0"/>
-                <a:cs typeface="Arial" panose="020B0604020202020204" pitchFamily="34" charset="0"/>
-              </a:rPr>
-              <a:t>Germany</a:t>
-            </a:r>
-          </a:p>
-        </p:txBody>
-      </p:sp>
-      <p:sp>
-        <p:nvSpPr>
-          <p:cNvPr id="26" name="TextBox 25">
-            <a:extLst>
-              <a:ext uri="{FF2B5EF4-FFF2-40B4-BE49-F238E27FC236}">
-                <a16:creationId xmlns:a16="http://schemas.microsoft.com/office/drawing/2014/main" id="{FD4D35CC-CCCF-4B83-BA15-1BE5A300EB18}"/>
-              </a:ext>
-            </a:extLst>
-          </p:cNvPr>
-          <p:cNvSpPr txBox="1"/>
-          <p:nvPr/>
-        </p:nvSpPr>
-        <p:spPr>
-          <a:xfrm>
-            <a:off x="1065322" y="5746687"/>
-            <a:ext cx="10324730" cy="707886"/>
-          </a:xfrm>
-          <a:prstGeom prst="rect">
-            <a:avLst/>
-          </a:prstGeom>
-          <a:noFill/>
-        </p:spPr>
-        <p:txBody>
-          <a:bodyPr wrap="square" rtlCol="0">
-            <a:spAutoFit/>
-          </a:bodyPr>
-          <a:lstStyle/>
-          <a:p>
-            <a:r>
-              <a:rPr lang="en-US" sz="2000" dirty="0"/>
-              <a:t>There is significant opportunity for the US to increase </a:t>
-            </a:r>
-            <a:r>
-              <a:rPr lang="en-US" sz="2000" b="1" dirty="0">
-                <a:solidFill>
-                  <a:schemeClr val="accent1"/>
-                </a:solidFill>
-              </a:rPr>
-              <a:t>renewable</a:t>
-            </a:r>
-            <a:r>
-              <a:rPr lang="en-US" sz="2000" dirty="0"/>
-              <a:t> energy sources (hydroelectric, solar, wind, biomass, and geothermal) compared to the current conventional</a:t>
-            </a:r>
-            <a:r>
-              <a:rPr lang="en-US" sz="2000" dirty="0">
-                <a:solidFill>
-                  <a:srgbClr val="C00000"/>
-                </a:solidFill>
-              </a:rPr>
-              <a:t> </a:t>
-            </a:r>
-            <a:r>
-              <a:rPr lang="en-US" sz="2000" b="1" dirty="0">
-                <a:solidFill>
-                  <a:srgbClr val="C00000"/>
-                </a:solidFill>
-              </a:rPr>
-              <a:t>thermal </a:t>
-            </a:r>
-            <a:r>
-              <a:rPr lang="en-US" sz="2000" dirty="0"/>
-              <a:t>sources.</a:t>
-            </a:r>
-          </a:p>
-        </p:txBody>
-      </p:sp>
-      <p:sp>
-        <p:nvSpPr>
-          <p:cNvPr id="27" name="TextBox 26">
-            <a:extLst>
-              <a:ext uri="{FF2B5EF4-FFF2-40B4-BE49-F238E27FC236}">
-                <a16:creationId xmlns:a16="http://schemas.microsoft.com/office/drawing/2014/main" id="{D2CDC13C-93D3-42A9-B1DF-97BABE1F4F5B}"/>
-              </a:ext>
-            </a:extLst>
-          </p:cNvPr>
-          <p:cNvSpPr txBox="1"/>
-          <p:nvPr/>
-        </p:nvSpPr>
-        <p:spPr>
-          <a:xfrm>
-            <a:off x="399495" y="5349670"/>
-            <a:ext cx="1704513" cy="261610"/>
-          </a:xfrm>
-          <a:prstGeom prst="rect">
-            <a:avLst/>
-          </a:prstGeom>
-          <a:noFill/>
-        </p:spPr>
-        <p:txBody>
-          <a:bodyPr wrap="square" rtlCol="0">
-            <a:spAutoFit/>
-          </a:bodyPr>
-          <a:lstStyle/>
-          <a:p>
-            <a:r>
-              <a:rPr lang="en-US" sz="1050" dirty="0"/>
-              <a:t>Source:</a:t>
-            </a:r>
-          </a:p>
-        </p:txBody>
-      </p:sp>
-      <p:sp>
-        <p:nvSpPr>
-          <p:cNvPr id="28" name="TextBox 27">
-            <a:extLst>
-              <a:ext uri="{FF2B5EF4-FFF2-40B4-BE49-F238E27FC236}">
-                <a16:creationId xmlns:a16="http://schemas.microsoft.com/office/drawing/2014/main" id="{A971E413-72C2-48E0-80DA-3D7BDAE8B952}"/>
-              </a:ext>
-            </a:extLst>
-          </p:cNvPr>
-          <p:cNvSpPr txBox="1"/>
-          <p:nvPr/>
-        </p:nvSpPr>
-        <p:spPr>
-          <a:xfrm>
-            <a:off x="6575282" y="5331394"/>
-            <a:ext cx="1704513" cy="261610"/>
-          </a:xfrm>
-          <a:prstGeom prst="rect">
-            <a:avLst/>
-          </a:prstGeom>
-          <a:noFill/>
-        </p:spPr>
-        <p:txBody>
-          <a:bodyPr wrap="square" rtlCol="0">
-            <a:spAutoFit/>
-          </a:bodyPr>
-          <a:lstStyle/>
-          <a:p>
-            <a:r>
-              <a:rPr lang="en-US" sz="1050" dirty="0"/>
-              <a:t>Source:</a:t>
-            </a:r>
-          </a:p>
-        </p:txBody>
-      </p:sp>
-      <p:pic>
-        <p:nvPicPr>
-          <p:cNvPr id="3" name="Picture 2">
-            <a:extLst>
-              <a:ext uri="{FF2B5EF4-FFF2-40B4-BE49-F238E27FC236}">
-                <a16:creationId xmlns:a16="http://schemas.microsoft.com/office/drawing/2014/main" id="{57F15A29-4FD4-4563-A4CD-6660BC2E3797}"/>
-              </a:ext>
-            </a:extLst>
-          </p:cNvPr>
-          <p:cNvPicPr>
-            <a:picLocks noChangeAspect="1"/>
-          </p:cNvPicPr>
-          <p:nvPr/>
-        </p:nvPicPr>
-        <p:blipFill>
-          <a:blip r:embed="rId3"/>
-          <a:stretch>
-            <a:fillRect/>
-          </a:stretch>
-        </p:blipFill>
-        <p:spPr>
-          <a:xfrm>
-            <a:off x="6227687" y="1210796"/>
-            <a:ext cx="5357324" cy="4084674"/>
-          </a:xfrm>
-          <a:prstGeom prst="rect">
-            <a:avLst/>
-          </a:prstGeom>
-        </p:spPr>
-      </p:pic>
+              <a:rPr lang="en-US" sz="1400" dirty="0"/>
+              <a:t>Source </a:t>
+            </a:r>
+          </a:p>
+        </p:txBody>
+      </p:sp>
     </p:spTree>
     <p:extLst>
       <p:ext uri="{BB962C8B-B14F-4D97-AF65-F5344CB8AC3E}">
-        <p14:creationId xmlns:p14="http://schemas.microsoft.com/office/powerpoint/2010/main" val="1727359884"/>
+        <p14:creationId xmlns:p14="http://schemas.microsoft.com/office/powerpoint/2010/main" val="3502177145"/>
       </p:ext>
     </p:extLst>
   </p:cSld>
@@ -4863,7 +5239,7 @@
           <p:cNvPr id="2" name="Title 1">
             <a:extLst>
               <a:ext uri="{FF2B5EF4-FFF2-40B4-BE49-F238E27FC236}">
-                <a16:creationId xmlns:a16="http://schemas.microsoft.com/office/drawing/2014/main" id="{CE5E869F-1358-4C50-ADE1-CB62DF4E9F46}"/>
+                <a16:creationId xmlns:a16="http://schemas.microsoft.com/office/drawing/2014/main" id="{7AA0A722-BCE2-40DF-AF05-32A677168B01}"/>
               </a:ext>
             </a:extLst>
           </p:cNvPr>
@@ -4876,80 +5252,125 @@
         </p:nvSpPr>
         <p:spPr>
           <a:xfrm>
-            <a:off x="177553" y="83820"/>
-            <a:ext cx="12014447" cy="1356360"/>
+            <a:off x="657606" y="0"/>
+            <a:ext cx="10772775" cy="1267691"/>
           </a:xfrm>
         </p:spPr>
         <p:txBody>
-          <a:bodyPr>
-            <a:normAutofit fontScale="90000"/>
-          </a:bodyPr>
+          <a:bodyPr/>
           <a:lstStyle/>
           <a:p>
             <a:r>
-              <a:rPr lang="en-US" dirty="0"/>
-              <a:t>Conventional thermal energy increases CO</a:t>
-            </a:r>
-            <a:r>
-              <a:rPr lang="en-US" baseline="-25000" dirty="0"/>
-              <a:t>2</a:t>
-            </a:r>
-            <a:r>
-              <a:rPr lang="en-US" dirty="0"/>
-              <a:t> emissions</a:t>
-            </a:r>
-          </a:p>
-        </p:txBody>
-      </p:sp>
-      <p:sp>
-        <p:nvSpPr>
-          <p:cNvPr id="3" name="Content Placeholder 2">
+              <a:rPr lang="en-US"/>
+              <a:t>Yeah, but isn’t it less reliable?</a:t>
+            </a:r>
+            <a:endParaRPr lang="en-US" dirty="0"/>
+          </a:p>
+        </p:txBody>
+      </p:sp>
+      <p:pic>
+        <p:nvPicPr>
+          <p:cNvPr id="9" name="Picture 8" descr="Chart, waterfall chart&#10;&#10;Description automatically generated">
             <a:extLst>
               <a:ext uri="{FF2B5EF4-FFF2-40B4-BE49-F238E27FC236}">
-                <a16:creationId xmlns:a16="http://schemas.microsoft.com/office/drawing/2014/main" id="{C6AF95EE-F2C7-4839-B8AC-B98879830429}"/>
+                <a16:creationId xmlns:a16="http://schemas.microsoft.com/office/drawing/2014/main" id="{842E2753-E903-4B98-A561-EBBCC52359E3}"/>
               </a:ext>
             </a:extLst>
           </p:cNvPr>
-          <p:cNvSpPr>
-            <a:spLocks noGrp="1"/>
-          </p:cNvSpPr>
-          <p:nvPr>
-            <p:ph idx="1"/>
-          </p:nvPr>
-        </p:nvSpPr>
-        <p:spPr/>
-        <p:txBody>
-          <a:bodyPr/>
-          <a:lstStyle/>
-          <a:p>
-            <a:endParaRPr lang="en-US"/>
-          </a:p>
-        </p:txBody>
-      </p:sp>
-      <p:sp>
-        <p:nvSpPr>
-          <p:cNvPr id="4" name="Footer Placeholder 3">
+          <p:cNvPicPr>
+            <a:picLocks noChangeAspect="1"/>
+          </p:cNvPicPr>
+          <p:nvPr/>
+        </p:nvPicPr>
+        <p:blipFill>
+          <a:blip r:embed="rId2">
+            <a:extLst>
+              <a:ext uri="{28A0092B-C50C-407E-A947-70E740481C1C}">
+                <a14:useLocalDpi xmlns:a14="http://schemas.microsoft.com/office/drawing/2010/main" val="0"/>
+              </a:ext>
+            </a:extLst>
+          </a:blip>
+          <a:stretch>
+            <a:fillRect/>
+          </a:stretch>
+        </p:blipFill>
+        <p:spPr>
+          <a:xfrm>
+            <a:off x="761619" y="1267691"/>
+            <a:ext cx="4693132" cy="4693132"/>
+          </a:xfrm>
+          <a:prstGeom prst="rect">
+            <a:avLst/>
+          </a:prstGeom>
+        </p:spPr>
+      </p:pic>
+      <p:pic>
+        <p:nvPicPr>
+          <p:cNvPr id="11" name="Picture 10" descr="Chart, waterfall chart&#10;&#10;Description automatically generated">
             <a:extLst>
               <a:ext uri="{FF2B5EF4-FFF2-40B4-BE49-F238E27FC236}">
-                <a16:creationId xmlns:a16="http://schemas.microsoft.com/office/drawing/2014/main" id="{CDF9F7CE-F2A1-4133-9C7F-6D24E3CA524D}"/>
+                <a16:creationId xmlns:a16="http://schemas.microsoft.com/office/drawing/2014/main" id="{CAC3F000-8D64-41CC-9EFF-5942AC78A436}"/>
               </a:ext>
             </a:extLst>
           </p:cNvPr>
-          <p:cNvSpPr>
-            <a:spLocks noGrp="1"/>
-          </p:cNvSpPr>
-          <p:nvPr>
-            <p:ph type="ftr" sz="quarter" idx="11"/>
-          </p:nvPr>
-        </p:nvSpPr>
-        <p:spPr/>
-        <p:txBody>
-          <a:bodyPr/>
+          <p:cNvPicPr>
+            <a:picLocks noChangeAspect="1"/>
+          </p:cNvPicPr>
+          <p:nvPr/>
+        </p:nvPicPr>
+        <p:blipFill>
+          <a:blip r:embed="rId3">
+            <a:extLst>
+              <a:ext uri="{28A0092B-C50C-407E-A947-70E740481C1C}">
+                <a14:useLocalDpi xmlns:a14="http://schemas.microsoft.com/office/drawing/2010/main" val="0"/>
+              </a:ext>
+            </a:extLst>
+          </a:blip>
+          <a:stretch>
+            <a:fillRect/>
+          </a:stretch>
+        </p:blipFill>
+        <p:spPr>
+          <a:xfrm>
+            <a:off x="6585623" y="1191878"/>
+            <a:ext cx="4844758" cy="4844758"/>
+          </a:xfrm>
+          <a:prstGeom prst="rect">
+            <a:avLst/>
+          </a:prstGeom>
+        </p:spPr>
+      </p:pic>
+      <p:sp>
+        <p:nvSpPr>
+          <p:cNvPr id="12" name="TextBox 11">
+            <a:extLst>
+              <a:ext uri="{FF2B5EF4-FFF2-40B4-BE49-F238E27FC236}">
+                <a16:creationId xmlns:a16="http://schemas.microsoft.com/office/drawing/2014/main" id="{E400A438-46CA-46C9-9865-70BBB591EC82}"/>
+              </a:ext>
+            </a:extLst>
+          </p:cNvPr>
+          <p:cNvSpPr txBox="1"/>
+          <p:nvPr/>
+        </p:nvSpPr>
+        <p:spPr>
+          <a:xfrm>
+            <a:off x="657606" y="6196614"/>
+            <a:ext cx="10342485" cy="369332"/>
+          </a:xfrm>
+          <a:prstGeom prst="rect">
+            <a:avLst/>
+          </a:prstGeom>
+          <a:noFill/>
+        </p:spPr>
+        <p:txBody>
+          <a:bodyPr wrap="square" rtlCol="0">
+            <a:spAutoFit/>
+          </a:bodyPr>
           <a:lstStyle/>
           <a:p>
             <a:r>
-              <a:rPr lang="en-US"/>
-              <a:t>Megan Ball DS6390</a:t>
+              <a:rPr lang="en-US" dirty="0"/>
+              <a:t>Despite its higher percentage of conventional thermal energy sources, the US has the highest SAIDI and SAIFI</a:t>
             </a:r>
           </a:p>
         </p:txBody>
@@ -4957,7 +5378,7 @@
     </p:spTree>
     <p:extLst>
       <p:ext uri="{BB962C8B-B14F-4D97-AF65-F5344CB8AC3E}">
-        <p14:creationId xmlns:p14="http://schemas.microsoft.com/office/powerpoint/2010/main" val="2139520975"/>
+        <p14:creationId xmlns:p14="http://schemas.microsoft.com/office/powerpoint/2010/main" val="2427145685"/>
       </p:ext>
     </p:extLst>
   </p:cSld>
@@ -4986,10 +5407,10 @@
       </p:grpSpPr>
       <p:sp>
         <p:nvSpPr>
-          <p:cNvPr id="12" name="Title 11">
+          <p:cNvPr id="2" name="Title 1">
             <a:extLst>
               <a:ext uri="{FF2B5EF4-FFF2-40B4-BE49-F238E27FC236}">
-                <a16:creationId xmlns:a16="http://schemas.microsoft.com/office/drawing/2014/main" id="{21E2C9D7-9845-4F38-8F81-E68F522589C4}"/>
+                <a16:creationId xmlns:a16="http://schemas.microsoft.com/office/drawing/2014/main" id="{65B18EA6-9C3E-4470-BB33-97DBDACF48AD}"/>
               </a:ext>
             </a:extLst>
           </p:cNvPr>
@@ -5002,8 +5423,8 @@
         </p:nvSpPr>
         <p:spPr>
           <a:xfrm>
-            <a:off x="201967" y="106532"/>
-            <a:ext cx="9875520" cy="1356360"/>
+            <a:off x="519572" y="0"/>
+            <a:ext cx="10772775" cy="1139225"/>
           </a:xfrm>
         </p:spPr>
         <p:txBody>
@@ -5012,121 +5433,669 @@
           <a:p>
             <a:r>
               <a:rPr lang="en-US" dirty="0"/>
-              <a:t>EU energy mix vs. US</a:t>
-            </a:r>
-          </a:p>
-        </p:txBody>
-      </p:sp>
-      <p:sp>
-        <p:nvSpPr>
-          <p:cNvPr id="13" name="Text Placeholder 12">
+              <a:t>Opportunities for Investment</a:t>
+            </a:r>
+          </a:p>
+        </p:txBody>
+      </p:sp>
+      <p:pic>
+        <p:nvPicPr>
+          <p:cNvPr id="10" name="Picture 9" descr="Chart, bar chart&#10;&#10;Description automatically generated">
             <a:extLst>
               <a:ext uri="{FF2B5EF4-FFF2-40B4-BE49-F238E27FC236}">
-                <a16:creationId xmlns:a16="http://schemas.microsoft.com/office/drawing/2014/main" id="{5C5C5D09-E4A1-4D30-A834-82DD163B4AA8}"/>
+                <a16:creationId xmlns:a16="http://schemas.microsoft.com/office/drawing/2014/main" id="{7CA53C31-38C1-4D70-95E6-532CED15A0F8}"/>
               </a:ext>
             </a:extLst>
           </p:cNvPr>
-          <p:cNvSpPr>
-            <a:spLocks noGrp="1"/>
-          </p:cNvSpPr>
-          <p:nvPr>
-            <p:ph type="body" idx="1"/>
-          </p:nvPr>
-        </p:nvSpPr>
-        <p:spPr/>
-        <p:txBody>
-          <a:bodyPr/>
-          <a:lstStyle/>
-          <a:p>
-            <a:endParaRPr lang="en-US"/>
-          </a:p>
-        </p:txBody>
-      </p:sp>
-      <p:sp>
-        <p:nvSpPr>
-          <p:cNvPr id="14" name="Content Placeholder 13">
+          <p:cNvPicPr>
+            <a:picLocks noChangeAspect="1"/>
+          </p:cNvPicPr>
+          <p:nvPr/>
+        </p:nvPicPr>
+        <p:blipFill>
+          <a:blip r:embed="rId2">
+            <a:extLst>
+              <a:ext uri="{28A0092B-C50C-407E-A947-70E740481C1C}">
+                <a14:useLocalDpi xmlns:a14="http://schemas.microsoft.com/office/drawing/2010/main" val="0"/>
+              </a:ext>
+            </a:extLst>
+          </a:blip>
+          <a:stretch>
+            <a:fillRect/>
+          </a:stretch>
+        </p:blipFill>
+        <p:spPr>
+          <a:xfrm>
+            <a:off x="1956956" y="973034"/>
+            <a:ext cx="8278090" cy="4965802"/>
+          </a:xfrm>
+          <a:prstGeom prst="rect">
+            <a:avLst/>
+          </a:prstGeom>
+        </p:spPr>
+      </p:pic>
+      <p:pic>
+        <p:nvPicPr>
+          <p:cNvPr id="12" name="Picture 11" descr="Chart, bar chart&#10;&#10;Description automatically generated">
             <a:extLst>
               <a:ext uri="{FF2B5EF4-FFF2-40B4-BE49-F238E27FC236}">
-                <a16:creationId xmlns:a16="http://schemas.microsoft.com/office/drawing/2014/main" id="{B31FCAC7-B3A8-4BAA-B9A0-36B34992544E}"/>
+                <a16:creationId xmlns:a16="http://schemas.microsoft.com/office/drawing/2014/main" id="{FE5807AE-0DA0-4ACF-ACD8-104C2149A130}"/>
               </a:ext>
             </a:extLst>
           </p:cNvPr>
-          <p:cNvSpPr>
-            <a:spLocks noGrp="1"/>
-          </p:cNvSpPr>
-          <p:nvPr>
-            <p:ph sz="half" idx="2"/>
-          </p:nvPr>
-        </p:nvSpPr>
-        <p:spPr/>
-        <p:txBody>
-          <a:bodyPr/>
-          <a:lstStyle/>
-          <a:p>
-            <a:endParaRPr lang="en-US"/>
-          </a:p>
-        </p:txBody>
-      </p:sp>
-      <p:sp>
-        <p:nvSpPr>
-          <p:cNvPr id="15" name="Text Placeholder 14">
+          <p:cNvPicPr>
+            <a:picLocks noChangeAspect="1"/>
+          </p:cNvPicPr>
+          <p:nvPr/>
+        </p:nvPicPr>
+        <p:blipFill>
+          <a:blip r:embed="rId3">
+            <a:extLst>
+              <a:ext uri="{28A0092B-C50C-407E-A947-70E740481C1C}">
+                <a14:useLocalDpi xmlns:a14="http://schemas.microsoft.com/office/drawing/2010/main" val="0"/>
+              </a:ext>
+            </a:extLst>
+          </a:blip>
+          <a:stretch>
+            <a:fillRect/>
+          </a:stretch>
+        </p:blipFill>
+        <p:spPr>
+          <a:xfrm>
+            <a:off x="1956954" y="963434"/>
+            <a:ext cx="8278090" cy="4965802"/>
+          </a:xfrm>
+          <a:prstGeom prst="rect">
+            <a:avLst/>
+          </a:prstGeom>
+        </p:spPr>
+      </p:pic>
+      <p:pic>
+        <p:nvPicPr>
+          <p:cNvPr id="14" name="Picture 13" descr="Chart, bar chart&#10;&#10;Description automatically generated">
             <a:extLst>
               <a:ext uri="{FF2B5EF4-FFF2-40B4-BE49-F238E27FC236}">
-                <a16:creationId xmlns:a16="http://schemas.microsoft.com/office/drawing/2014/main" id="{C8DBF920-6AE0-46F5-94FC-2364C64AA0CC}"/>
+                <a16:creationId xmlns:a16="http://schemas.microsoft.com/office/drawing/2014/main" id="{FA50AE65-3E40-41E5-B38E-A091B23C8CD6}"/>
               </a:ext>
             </a:extLst>
           </p:cNvPr>
-          <p:cNvSpPr>
-            <a:spLocks noGrp="1"/>
-          </p:cNvSpPr>
-          <p:nvPr>
-            <p:ph type="body" sz="quarter" idx="3"/>
-          </p:nvPr>
-        </p:nvSpPr>
-        <p:spPr/>
-        <p:txBody>
-          <a:bodyPr/>
-          <a:lstStyle/>
-          <a:p>
-            <a:endParaRPr lang="en-US"/>
-          </a:p>
-        </p:txBody>
-      </p:sp>
-      <p:sp>
-        <p:nvSpPr>
-          <p:cNvPr id="16" name="Content Placeholder 15">
+          <p:cNvPicPr>
+            <a:picLocks noChangeAspect="1"/>
+          </p:cNvPicPr>
+          <p:nvPr/>
+        </p:nvPicPr>
+        <p:blipFill>
+          <a:blip r:embed="rId4">
+            <a:extLst>
+              <a:ext uri="{28A0092B-C50C-407E-A947-70E740481C1C}">
+                <a14:useLocalDpi xmlns:a14="http://schemas.microsoft.com/office/drawing/2010/main" val="0"/>
+              </a:ext>
+            </a:extLst>
+          </a:blip>
+          <a:stretch>
+            <a:fillRect/>
+          </a:stretch>
+        </p:blipFill>
+        <p:spPr>
+          <a:xfrm>
+            <a:off x="1997281" y="963434"/>
+            <a:ext cx="8278090" cy="4965802"/>
+          </a:xfrm>
+          <a:prstGeom prst="rect">
+            <a:avLst/>
+          </a:prstGeom>
+        </p:spPr>
+      </p:pic>
+      <p:pic>
+        <p:nvPicPr>
+          <p:cNvPr id="16" name="Picture 15" descr="Chart, bar chart&#10;&#10;Description automatically generated">
             <a:extLst>
               <a:ext uri="{FF2B5EF4-FFF2-40B4-BE49-F238E27FC236}">
-                <a16:creationId xmlns:a16="http://schemas.microsoft.com/office/drawing/2014/main" id="{97E98151-684C-47B2-A2FC-7A185AF31E38}"/>
+                <a16:creationId xmlns:a16="http://schemas.microsoft.com/office/drawing/2014/main" id="{6379A473-E807-49A5-84BC-6BD781701311}"/>
               </a:ext>
             </a:extLst>
           </p:cNvPr>
-          <p:cNvSpPr>
-            <a:spLocks noGrp="1"/>
-          </p:cNvSpPr>
-          <p:nvPr>
-            <p:ph sz="quarter" idx="4"/>
-          </p:nvPr>
-        </p:nvSpPr>
-        <p:spPr/>
-        <p:txBody>
-          <a:bodyPr/>
+          <p:cNvPicPr>
+            <a:picLocks noChangeAspect="1"/>
+          </p:cNvPicPr>
+          <p:nvPr/>
+        </p:nvPicPr>
+        <p:blipFill>
+          <a:blip r:embed="rId5">
+            <a:extLst>
+              <a:ext uri="{28A0092B-C50C-407E-A947-70E740481C1C}">
+                <a14:useLocalDpi xmlns:a14="http://schemas.microsoft.com/office/drawing/2010/main" val="0"/>
+              </a:ext>
+            </a:extLst>
+          </a:blip>
+          <a:stretch>
+            <a:fillRect/>
+          </a:stretch>
+        </p:blipFill>
+        <p:spPr>
+          <a:xfrm>
+            <a:off x="1997281" y="946099"/>
+            <a:ext cx="8278090" cy="4965802"/>
+          </a:xfrm>
+          <a:prstGeom prst="rect">
+            <a:avLst/>
+          </a:prstGeom>
+        </p:spPr>
+      </p:pic>
+      <p:sp>
+        <p:nvSpPr>
+          <p:cNvPr id="17" name="TextBox 16">
+            <a:extLst>
+              <a:ext uri="{FF2B5EF4-FFF2-40B4-BE49-F238E27FC236}">
+                <a16:creationId xmlns:a16="http://schemas.microsoft.com/office/drawing/2014/main" id="{44DBC6FA-83C9-456B-8A9A-A5FC57C7112C}"/>
+              </a:ext>
+            </a:extLst>
+          </p:cNvPr>
+          <p:cNvSpPr txBox="1"/>
+          <p:nvPr/>
+        </p:nvSpPr>
+        <p:spPr>
+          <a:xfrm>
+            <a:off x="519572" y="5911901"/>
+            <a:ext cx="11426488" cy="707886"/>
+          </a:xfrm>
+          <a:prstGeom prst="rect">
+            <a:avLst/>
+          </a:prstGeom>
+          <a:noFill/>
+        </p:spPr>
+        <p:txBody>
+          <a:bodyPr wrap="square" rtlCol="0">
+            <a:spAutoFit/>
+          </a:bodyPr>
           <a:lstStyle/>
           <a:p>
-            <a:endParaRPr lang="en-US"/>
+            <a:r>
+              <a:rPr lang="en-US" sz="2000" dirty="0"/>
+              <a:t>There are several renewable sources that could use additional investment to decrease the overall reliance of the US on conventional thermal energy sources.</a:t>
+            </a:r>
+          </a:p>
+        </p:txBody>
+      </p:sp>
+      <p:sp>
+        <p:nvSpPr>
+          <p:cNvPr id="18" name="TextBox 17">
+            <a:extLst>
+              <a:ext uri="{FF2B5EF4-FFF2-40B4-BE49-F238E27FC236}">
+                <a16:creationId xmlns:a16="http://schemas.microsoft.com/office/drawing/2014/main" id="{04170393-207D-4C69-8260-C17BFF6EE2FA}"/>
+              </a:ext>
+            </a:extLst>
+          </p:cNvPr>
+          <p:cNvSpPr txBox="1"/>
+          <p:nvPr/>
+        </p:nvSpPr>
+        <p:spPr>
+          <a:xfrm>
+            <a:off x="4356293" y="1174328"/>
+            <a:ext cx="3919168" cy="646331"/>
+          </a:xfrm>
+          <a:prstGeom prst="rect">
+            <a:avLst/>
+          </a:prstGeom>
+          <a:noFill/>
+        </p:spPr>
+        <p:txBody>
+          <a:bodyPr wrap="square" rtlCol="0">
+            <a:spAutoFit/>
+          </a:bodyPr>
+          <a:lstStyle/>
+          <a:p>
+            <a:r>
+              <a:rPr lang="en-US" dirty="0"/>
+              <a:t>Wind is only about 2.6% of the renewable energy generated in the US.</a:t>
+            </a:r>
+          </a:p>
+        </p:txBody>
+      </p:sp>
+      <p:sp>
+        <p:nvSpPr>
+          <p:cNvPr id="19" name="TextBox 18">
+            <a:extLst>
+              <a:ext uri="{FF2B5EF4-FFF2-40B4-BE49-F238E27FC236}">
+                <a16:creationId xmlns:a16="http://schemas.microsoft.com/office/drawing/2014/main" id="{BB53A1F2-7BA9-4372-A0A3-DF2C0FFC9424}"/>
+              </a:ext>
+            </a:extLst>
+          </p:cNvPr>
+          <p:cNvSpPr txBox="1"/>
+          <p:nvPr/>
+        </p:nvSpPr>
+        <p:spPr>
+          <a:xfrm>
+            <a:off x="4356293" y="1158180"/>
+            <a:ext cx="4190006" cy="646331"/>
+          </a:xfrm>
+          <a:prstGeom prst="rect">
+            <a:avLst/>
+          </a:prstGeom>
+          <a:noFill/>
+        </p:spPr>
+        <p:txBody>
+          <a:bodyPr wrap="square" rtlCol="0">
+            <a:spAutoFit/>
+          </a:bodyPr>
+          <a:lstStyle/>
+          <a:p>
+            <a:r>
+              <a:rPr lang="en-US" dirty="0"/>
+              <a:t>Solar is only about 0.7% of the renewable energy generated in the US.</a:t>
+            </a:r>
+          </a:p>
+        </p:txBody>
+      </p:sp>
+      <p:sp>
+        <p:nvSpPr>
+          <p:cNvPr id="20" name="TextBox 19">
+            <a:extLst>
+              <a:ext uri="{FF2B5EF4-FFF2-40B4-BE49-F238E27FC236}">
+                <a16:creationId xmlns:a16="http://schemas.microsoft.com/office/drawing/2014/main" id="{5542A5FA-D281-448A-AA1B-5064841F08F9}"/>
+              </a:ext>
+            </a:extLst>
+          </p:cNvPr>
+          <p:cNvSpPr txBox="1"/>
+          <p:nvPr/>
+        </p:nvSpPr>
+        <p:spPr>
+          <a:xfrm>
+            <a:off x="3907022" y="1183671"/>
+            <a:ext cx="4817710" cy="646331"/>
+          </a:xfrm>
+          <a:prstGeom prst="rect">
+            <a:avLst/>
+          </a:prstGeom>
+          <a:noFill/>
+        </p:spPr>
+        <p:txBody>
+          <a:bodyPr wrap="square" rtlCol="0">
+            <a:spAutoFit/>
+          </a:bodyPr>
+          <a:lstStyle/>
+          <a:p>
+            <a:r>
+              <a:rPr lang="en-US" dirty="0"/>
+              <a:t>Nuclear is about 10.7% of the renewable energy generated in the US.</a:t>
+            </a:r>
+          </a:p>
+        </p:txBody>
+      </p:sp>
+      <p:sp>
+        <p:nvSpPr>
+          <p:cNvPr id="21" name="TextBox 20">
+            <a:extLst>
+              <a:ext uri="{FF2B5EF4-FFF2-40B4-BE49-F238E27FC236}">
+                <a16:creationId xmlns:a16="http://schemas.microsoft.com/office/drawing/2014/main" id="{27440617-40C8-4F0B-AF54-3680C251F558}"/>
+              </a:ext>
+            </a:extLst>
+          </p:cNvPr>
+          <p:cNvSpPr txBox="1"/>
+          <p:nvPr/>
+        </p:nvSpPr>
+        <p:spPr>
+          <a:xfrm>
+            <a:off x="4415737" y="1189743"/>
+            <a:ext cx="4349320" cy="646331"/>
+          </a:xfrm>
+          <a:prstGeom prst="rect">
+            <a:avLst/>
+          </a:prstGeom>
+          <a:noFill/>
+        </p:spPr>
+        <p:txBody>
+          <a:bodyPr wrap="square" rtlCol="0">
+            <a:spAutoFit/>
+          </a:bodyPr>
+          <a:lstStyle/>
+          <a:p>
+            <a:r>
+              <a:rPr lang="en-US" dirty="0"/>
+              <a:t>Hydro is only about 3.1% of the renewable energy generated in the US.</a:t>
+            </a:r>
           </a:p>
         </p:txBody>
       </p:sp>
     </p:spTree>
     <p:extLst>
       <p:ext uri="{BB962C8B-B14F-4D97-AF65-F5344CB8AC3E}">
-        <p14:creationId xmlns:p14="http://schemas.microsoft.com/office/powerpoint/2010/main" val="1322551834"/>
+        <p14:creationId xmlns:p14="http://schemas.microsoft.com/office/powerpoint/2010/main" val="2118195577"/>
       </p:ext>
     </p:extLst>
   </p:cSld>
   <p:clrMapOvr>
     <a:masterClrMapping/>
   </p:clrMapOvr>
+  <p:timing>
+    <p:tnLst>
+      <p:par>
+        <p:cTn id="1" dur="indefinite" restart="never" nodeType="tmRoot">
+          <p:childTnLst>
+            <p:seq concurrent="1" nextAc="seek">
+              <p:cTn id="2" dur="indefinite" nodeType="mainSeq">
+                <p:childTnLst>
+                  <p:par>
+                    <p:cTn id="3" fill="hold">
+                      <p:stCondLst>
+                        <p:cond delay="indefinite"/>
+                      </p:stCondLst>
+                      <p:childTnLst>
+                        <p:par>
+                          <p:cTn id="4" fill="hold">
+                            <p:stCondLst>
+                              <p:cond delay="0"/>
+                            </p:stCondLst>
+                            <p:childTnLst>
+                              <p:par>
+                                <p:cTn id="5" presetID="1" presetClass="exit" presetSubtype="0" fill="hold" grpId="0" nodeType="clickEffect">
+                                  <p:stCondLst>
+                                    <p:cond delay="0"/>
+                                  </p:stCondLst>
+                                  <p:childTnLst>
+                                    <p:set>
+                                      <p:cBhvr>
+                                        <p:cTn id="6" dur="1" fill="hold">
+                                          <p:stCondLst>
+                                            <p:cond delay="0"/>
+                                          </p:stCondLst>
+                                        </p:cTn>
+                                        <p:tgtEl>
+                                          <p:spTgt spid="18"/>
+                                        </p:tgtEl>
+                                        <p:attrNameLst>
+                                          <p:attrName>style.visibility</p:attrName>
+                                        </p:attrNameLst>
+                                      </p:cBhvr>
+                                      <p:to>
+                                        <p:strVal val="hidden"/>
+                                      </p:to>
+                                    </p:set>
+                                  </p:childTnLst>
+                                </p:cTn>
+                              </p:par>
+                            </p:childTnLst>
+                          </p:cTn>
+                        </p:par>
+                      </p:childTnLst>
+                    </p:cTn>
+                  </p:par>
+                  <p:par>
+                    <p:cTn id="7" fill="hold">
+                      <p:stCondLst>
+                        <p:cond delay="indefinite"/>
+                      </p:stCondLst>
+                      <p:childTnLst>
+                        <p:par>
+                          <p:cTn id="8" fill="hold">
+                            <p:stCondLst>
+                              <p:cond delay="0"/>
+                            </p:stCondLst>
+                            <p:childTnLst>
+                              <p:par>
+                                <p:cTn id="9" presetID="1" presetClass="entr" presetSubtype="0" fill="hold" nodeType="clickEffect">
+                                  <p:stCondLst>
+                                    <p:cond delay="0"/>
+                                  </p:stCondLst>
+                                  <p:childTnLst>
+                                    <p:set>
+                                      <p:cBhvr>
+                                        <p:cTn id="10" dur="1" fill="hold">
+                                          <p:stCondLst>
+                                            <p:cond delay="0"/>
+                                          </p:stCondLst>
+                                        </p:cTn>
+                                        <p:tgtEl>
+                                          <p:spTgt spid="12"/>
+                                        </p:tgtEl>
+                                        <p:attrNameLst>
+                                          <p:attrName>style.visibility</p:attrName>
+                                        </p:attrNameLst>
+                                      </p:cBhvr>
+                                      <p:to>
+                                        <p:strVal val="visible"/>
+                                      </p:to>
+                                    </p:set>
+                                  </p:childTnLst>
+                                </p:cTn>
+                              </p:par>
+                              <p:par>
+                                <p:cTn id="11" presetID="1" presetClass="entr" presetSubtype="0" fill="hold" grpId="0" nodeType="withEffect">
+                                  <p:stCondLst>
+                                    <p:cond delay="0"/>
+                                  </p:stCondLst>
+                                  <p:childTnLst>
+                                    <p:set>
+                                      <p:cBhvr>
+                                        <p:cTn id="12" dur="1" fill="hold">
+                                          <p:stCondLst>
+                                            <p:cond delay="0"/>
+                                          </p:stCondLst>
+                                        </p:cTn>
+                                        <p:tgtEl>
+                                          <p:spTgt spid="19"/>
+                                        </p:tgtEl>
+                                        <p:attrNameLst>
+                                          <p:attrName>style.visibility</p:attrName>
+                                        </p:attrNameLst>
+                                      </p:cBhvr>
+                                      <p:to>
+                                        <p:strVal val="visible"/>
+                                      </p:to>
+                                    </p:set>
+                                  </p:childTnLst>
+                                  <p:subTnLst>
+                                    <p:set>
+                                      <p:cBhvr override="childStyle">
+                                        <p:cTn dur="1" fill="hold" display="0" masterRel="nextClick" afterEffect="1"/>
+                                        <p:tgtEl>
+                                          <p:spTgt spid="19"/>
+                                        </p:tgtEl>
+                                        <p:attrNameLst>
+                                          <p:attrName>style.visibility</p:attrName>
+                                        </p:attrNameLst>
+                                      </p:cBhvr>
+                                      <p:to>
+                                        <p:strVal val="hidden"/>
+                                      </p:to>
+                                    </p:set>
+                                  </p:subTnLst>
+                                </p:cTn>
+                              </p:par>
+                            </p:childTnLst>
+                          </p:cTn>
+                        </p:par>
+                      </p:childTnLst>
+                    </p:cTn>
+                  </p:par>
+                  <p:par>
+                    <p:cTn id="13" fill="hold">
+                      <p:stCondLst>
+                        <p:cond delay="indefinite"/>
+                      </p:stCondLst>
+                      <p:childTnLst>
+                        <p:par>
+                          <p:cTn id="14" fill="hold">
+                            <p:stCondLst>
+                              <p:cond delay="0"/>
+                            </p:stCondLst>
+                            <p:childTnLst>
+                              <p:par>
+                                <p:cTn id="15" presetID="1" presetClass="entr" presetSubtype="0" fill="hold" nodeType="clickEffect">
+                                  <p:stCondLst>
+                                    <p:cond delay="0"/>
+                                  </p:stCondLst>
+                                  <p:childTnLst>
+                                    <p:set>
+                                      <p:cBhvr>
+                                        <p:cTn id="16" dur="1" fill="hold">
+                                          <p:stCondLst>
+                                            <p:cond delay="0"/>
+                                          </p:stCondLst>
+                                        </p:cTn>
+                                        <p:tgtEl>
+                                          <p:spTgt spid="14"/>
+                                        </p:tgtEl>
+                                        <p:attrNameLst>
+                                          <p:attrName>style.visibility</p:attrName>
+                                        </p:attrNameLst>
+                                      </p:cBhvr>
+                                      <p:to>
+                                        <p:strVal val="visible"/>
+                                      </p:to>
+                                    </p:set>
+                                  </p:childTnLst>
+                                </p:cTn>
+                              </p:par>
+                              <p:par>
+                                <p:cTn id="17" presetID="1" presetClass="entr" presetSubtype="0" fill="hold" grpId="0" nodeType="withEffect">
+                                  <p:stCondLst>
+                                    <p:cond delay="0"/>
+                                  </p:stCondLst>
+                                  <p:childTnLst>
+                                    <p:set>
+                                      <p:cBhvr>
+                                        <p:cTn id="18" dur="1" fill="hold">
+                                          <p:stCondLst>
+                                            <p:cond delay="0"/>
+                                          </p:stCondLst>
+                                        </p:cTn>
+                                        <p:tgtEl>
+                                          <p:spTgt spid="20"/>
+                                        </p:tgtEl>
+                                        <p:attrNameLst>
+                                          <p:attrName>style.visibility</p:attrName>
+                                        </p:attrNameLst>
+                                      </p:cBhvr>
+                                      <p:to>
+                                        <p:strVal val="visible"/>
+                                      </p:to>
+                                    </p:set>
+                                  </p:childTnLst>
+                                  <p:subTnLst>
+                                    <p:set>
+                                      <p:cBhvr override="childStyle">
+                                        <p:cTn dur="1" fill="hold" display="0" masterRel="nextClick" afterEffect="1"/>
+                                        <p:tgtEl>
+                                          <p:spTgt spid="20"/>
+                                        </p:tgtEl>
+                                        <p:attrNameLst>
+                                          <p:attrName>style.visibility</p:attrName>
+                                        </p:attrNameLst>
+                                      </p:cBhvr>
+                                      <p:to>
+                                        <p:strVal val="hidden"/>
+                                      </p:to>
+                                    </p:set>
+                                  </p:subTnLst>
+                                </p:cTn>
+                              </p:par>
+                            </p:childTnLst>
+                          </p:cTn>
+                        </p:par>
+                      </p:childTnLst>
+                    </p:cTn>
+                  </p:par>
+                  <p:par>
+                    <p:cTn id="19" fill="hold">
+                      <p:stCondLst>
+                        <p:cond delay="indefinite"/>
+                      </p:stCondLst>
+                      <p:childTnLst>
+                        <p:par>
+                          <p:cTn id="20" fill="hold">
+                            <p:stCondLst>
+                              <p:cond delay="0"/>
+                            </p:stCondLst>
+                            <p:childTnLst>
+                              <p:par>
+                                <p:cTn id="21" presetID="1" presetClass="entr" presetSubtype="0" fill="hold" nodeType="clickEffect">
+                                  <p:stCondLst>
+                                    <p:cond delay="0"/>
+                                  </p:stCondLst>
+                                  <p:childTnLst>
+                                    <p:set>
+                                      <p:cBhvr>
+                                        <p:cTn id="22" dur="1" fill="hold">
+                                          <p:stCondLst>
+                                            <p:cond delay="0"/>
+                                          </p:stCondLst>
+                                        </p:cTn>
+                                        <p:tgtEl>
+                                          <p:spTgt spid="16"/>
+                                        </p:tgtEl>
+                                        <p:attrNameLst>
+                                          <p:attrName>style.visibility</p:attrName>
+                                        </p:attrNameLst>
+                                      </p:cBhvr>
+                                      <p:to>
+                                        <p:strVal val="visible"/>
+                                      </p:to>
+                                    </p:set>
+                                  </p:childTnLst>
+                                </p:cTn>
+                              </p:par>
+                              <p:par>
+                                <p:cTn id="23" presetID="1" presetClass="entr" presetSubtype="0" fill="hold" grpId="0" nodeType="withEffect">
+                                  <p:stCondLst>
+                                    <p:cond delay="0"/>
+                                  </p:stCondLst>
+                                  <p:childTnLst>
+                                    <p:set>
+                                      <p:cBhvr>
+                                        <p:cTn id="24" dur="1" fill="hold">
+                                          <p:stCondLst>
+                                            <p:cond delay="0"/>
+                                          </p:stCondLst>
+                                        </p:cTn>
+                                        <p:tgtEl>
+                                          <p:spTgt spid="21"/>
+                                        </p:tgtEl>
+                                        <p:attrNameLst>
+                                          <p:attrName>style.visibility</p:attrName>
+                                        </p:attrNameLst>
+                                      </p:cBhvr>
+                                      <p:to>
+                                        <p:strVal val="visible"/>
+                                      </p:to>
+                                    </p:set>
+                                  </p:childTnLst>
+                                </p:cTn>
+                              </p:par>
+                            </p:childTnLst>
+                          </p:cTn>
+                        </p:par>
+                      </p:childTnLst>
+                    </p:cTn>
+                  </p:par>
+                </p:childTnLst>
+              </p:cTn>
+              <p:prevCondLst>
+                <p:cond evt="onPrev" delay="0">
+                  <p:tgtEl>
+                    <p:sldTgt/>
+                  </p:tgtEl>
+                </p:cond>
+              </p:prevCondLst>
+              <p:nextCondLst>
+                <p:cond evt="onNext" delay="0">
+                  <p:tgtEl>
+                    <p:sldTgt/>
+                  </p:tgtEl>
+                </p:cond>
+              </p:nextCondLst>
+            </p:seq>
+          </p:childTnLst>
+        </p:cTn>
+      </p:par>
+    </p:tnLst>
+    <p:bldLst>
+      <p:bldP spid="18" grpId="0"/>
+      <p:bldP spid="19" grpId="0"/>
+      <p:bldP spid="20" grpId="0"/>
+      <p:bldP spid="21" grpId="0"/>
+    </p:bldLst>
+  </p:timing>
 </p:sld>
 </file>
 
@@ -5152,7 +6121,7 @@
           <p:cNvPr id="2" name="Title 1">
             <a:extLst>
               <a:ext uri="{FF2B5EF4-FFF2-40B4-BE49-F238E27FC236}">
-                <a16:creationId xmlns:a16="http://schemas.microsoft.com/office/drawing/2014/main" id="{7AA0A722-BCE2-40DF-AF05-32A677168B01}"/>
+                <a16:creationId xmlns:a16="http://schemas.microsoft.com/office/drawing/2014/main" id="{F2CC5150-EBC0-47B8-957F-8668501AD83E}"/>
               </a:ext>
             </a:extLst>
           </p:cNvPr>
@@ -5170,17 +6139,17 @@
           <a:p>
             <a:r>
               <a:rPr lang="en-US" dirty="0"/>
-              <a:t>Yes but…reliability! </a:t>
-            </a:r>
-          </a:p>
-        </p:txBody>
-      </p:sp>
-      <p:sp>
-        <p:nvSpPr>
-          <p:cNvPr id="5" name="Content Placeholder 4">
+              <a:t>Summary</a:t>
+            </a:r>
+          </a:p>
+        </p:txBody>
+      </p:sp>
+      <p:sp>
+        <p:nvSpPr>
+          <p:cNvPr id="3" name="Content Placeholder 2">
             <a:extLst>
               <a:ext uri="{FF2B5EF4-FFF2-40B4-BE49-F238E27FC236}">
-                <a16:creationId xmlns:a16="http://schemas.microsoft.com/office/drawing/2014/main" id="{2ADBE8BF-79EF-470D-884C-27F90998A057}"/>
+                <a16:creationId xmlns:a16="http://schemas.microsoft.com/office/drawing/2014/main" id="{5DEA6353-2B51-439A-BF14-DF37AA35CDC1}"/>
               </a:ext>
             </a:extLst>
           </p:cNvPr>
@@ -5202,10 +6171,10 @@
       </p:sp>
       <p:sp>
         <p:nvSpPr>
-          <p:cNvPr id="6" name="Content Placeholder 5">
+          <p:cNvPr id="4" name="Content Placeholder 3">
             <a:extLst>
               <a:ext uri="{FF2B5EF4-FFF2-40B4-BE49-F238E27FC236}">
-                <a16:creationId xmlns:a16="http://schemas.microsoft.com/office/drawing/2014/main" id="{2E4B8800-9BAA-4380-BA7F-2A4B574CDF45}"/>
+                <a16:creationId xmlns:a16="http://schemas.microsoft.com/office/drawing/2014/main" id="{6C3CC44C-3256-4B86-9CFE-9CB6618F3C6F}"/>
               </a:ext>
             </a:extLst>
           </p:cNvPr>
@@ -5225,10 +6194,38 @@
           </a:p>
         </p:txBody>
       </p:sp>
+      <p:sp>
+        <p:nvSpPr>
+          <p:cNvPr id="5" name="Footer Placeholder 4">
+            <a:extLst>
+              <a:ext uri="{FF2B5EF4-FFF2-40B4-BE49-F238E27FC236}">
+                <a16:creationId xmlns:a16="http://schemas.microsoft.com/office/drawing/2014/main" id="{D4B089DD-D72A-4221-BAE1-2FED85555AE6}"/>
+              </a:ext>
+            </a:extLst>
+          </p:cNvPr>
+          <p:cNvSpPr>
+            <a:spLocks noGrp="1"/>
+          </p:cNvSpPr>
+          <p:nvPr>
+            <p:ph type="ftr" sz="quarter" idx="11"/>
+          </p:nvPr>
+        </p:nvSpPr>
+        <p:spPr/>
+        <p:txBody>
+          <a:bodyPr/>
+          <a:lstStyle/>
+          <a:p>
+            <a:r>
+              <a:rPr lang="en-US"/>
+              <a:t>Megan Ball DS6390</a:t>
+            </a:r>
+          </a:p>
+        </p:txBody>
+      </p:sp>
     </p:spTree>
     <p:extLst>
       <p:ext uri="{BB962C8B-B14F-4D97-AF65-F5344CB8AC3E}">
-        <p14:creationId xmlns:p14="http://schemas.microsoft.com/office/powerpoint/2010/main" val="2427145685"/>
+        <p14:creationId xmlns:p14="http://schemas.microsoft.com/office/powerpoint/2010/main" val="3086902116"/>
       </p:ext>
     </p:extLst>
   </p:cSld>
@@ -5257,111 +6254,6 @@
       </p:grpSpPr>
       <p:sp>
         <p:nvSpPr>
-          <p:cNvPr id="2" name="Title 1">
-            <a:extLst>
-              <a:ext uri="{FF2B5EF4-FFF2-40B4-BE49-F238E27FC236}">
-                <a16:creationId xmlns:a16="http://schemas.microsoft.com/office/drawing/2014/main" id="{65B18EA6-9C3E-4470-BB33-97DBDACF48AD}"/>
-              </a:ext>
-            </a:extLst>
-          </p:cNvPr>
-          <p:cNvSpPr>
-            <a:spLocks noGrp="1"/>
-          </p:cNvSpPr>
-          <p:nvPr>
-            <p:ph type="title"/>
-          </p:nvPr>
-        </p:nvSpPr>
-        <p:spPr/>
-        <p:txBody>
-          <a:bodyPr/>
-          <a:lstStyle/>
-          <a:p>
-            <a:endParaRPr lang="en-US" dirty="0"/>
-          </a:p>
-        </p:txBody>
-      </p:sp>
-      <p:sp>
-        <p:nvSpPr>
-          <p:cNvPr id="3" name="Content Placeholder 2">
-            <a:extLst>
-              <a:ext uri="{FF2B5EF4-FFF2-40B4-BE49-F238E27FC236}">
-                <a16:creationId xmlns:a16="http://schemas.microsoft.com/office/drawing/2014/main" id="{8736A82D-2968-483E-8038-E5097F1833C9}"/>
-              </a:ext>
-            </a:extLst>
-          </p:cNvPr>
-          <p:cNvSpPr>
-            <a:spLocks noGrp="1"/>
-          </p:cNvSpPr>
-          <p:nvPr>
-            <p:ph sz="half" idx="1"/>
-          </p:nvPr>
-        </p:nvSpPr>
-        <p:spPr/>
-        <p:txBody>
-          <a:bodyPr/>
-          <a:lstStyle/>
-          <a:p>
-            <a:endParaRPr lang="en-US"/>
-          </a:p>
-        </p:txBody>
-      </p:sp>
-      <p:sp>
-        <p:nvSpPr>
-          <p:cNvPr id="4" name="Content Placeholder 3">
-            <a:extLst>
-              <a:ext uri="{FF2B5EF4-FFF2-40B4-BE49-F238E27FC236}">
-                <a16:creationId xmlns:a16="http://schemas.microsoft.com/office/drawing/2014/main" id="{3A8DBADE-DFDC-4BDD-AF59-F221AB994C61}"/>
-              </a:ext>
-            </a:extLst>
-          </p:cNvPr>
-          <p:cNvSpPr>
-            <a:spLocks noGrp="1"/>
-          </p:cNvSpPr>
-          <p:nvPr>
-            <p:ph sz="half" idx="2"/>
-          </p:nvPr>
-        </p:nvSpPr>
-        <p:spPr/>
-        <p:txBody>
-          <a:bodyPr/>
-          <a:lstStyle/>
-          <a:p>
-            <a:endParaRPr lang="en-US"/>
-          </a:p>
-        </p:txBody>
-      </p:sp>
-    </p:spTree>
-    <p:extLst>
-      <p:ext uri="{BB962C8B-B14F-4D97-AF65-F5344CB8AC3E}">
-        <p14:creationId xmlns:p14="http://schemas.microsoft.com/office/powerpoint/2010/main" val="2118195577"/>
-      </p:ext>
-    </p:extLst>
-  </p:cSld>
-  <p:clrMapOvr>
-    <a:masterClrMapping/>
-  </p:clrMapOvr>
-</p:sld>
-</file>
-
-<file path=ppt/slides/slide9.xml><?xml version="1.0" encoding="utf-8"?>
-<p:sld xmlns:a="http://schemas.openxmlformats.org/drawingml/2006/main" xmlns:r="http://schemas.openxmlformats.org/officeDocument/2006/relationships" xmlns:p="http://schemas.openxmlformats.org/presentationml/2006/main">
-  <p:cSld>
-    <p:spTree>
-      <p:nvGrpSpPr>
-        <p:cNvPr id="1" name=""/>
-        <p:cNvGrpSpPr/>
-        <p:nvPr/>
-      </p:nvGrpSpPr>
-      <p:grpSpPr>
-        <a:xfrm>
-          <a:off x="0" y="0"/>
-          <a:ext cx="0" cy="0"/>
-          <a:chOff x="0" y="0"/>
-          <a:chExt cx="0" cy="0"/>
-        </a:xfrm>
-      </p:grpSpPr>
-      <p:sp>
-        <p:nvSpPr>
           <p:cNvPr id="6" name="Title 5">
             <a:extLst>
               <a:ext uri="{FF2B5EF4-FFF2-40B4-BE49-F238E27FC236}">
@@ -5376,7 +6268,12 @@
             <p:ph type="title"/>
           </p:nvPr>
         </p:nvSpPr>
-        <p:spPr/>
+        <p:spPr>
+          <a:xfrm>
+            <a:off x="676656" y="0"/>
+            <a:ext cx="10772775" cy="1658198"/>
+          </a:xfrm>
+        </p:spPr>
         <p:txBody>
           <a:bodyPr/>
           <a:lstStyle/>
@@ -5407,13 +6304,13 @@
         <p:spPr/>
         <p:txBody>
           <a:bodyPr>
-            <a:normAutofit fontScale="92500" lnSpcReduction="20000"/>
+            <a:normAutofit fontScale="85000" lnSpcReduction="20000"/>
           </a:bodyPr>
           <a:lstStyle/>
           <a:p>
             <a:r>
               <a:rPr lang="en-US" dirty="0"/>
-              <a:t>Europe outage data: </a:t>
+              <a:t>[1] Council of European Energy Regulators. (2018). CEER Benchmarking Report 6.1 on the Continuity of 	Electricity and Gas Supply. Retrieved April 20, 2021 from: 	</a:t>
             </a:r>
             <a:r>
               <a:rPr lang="en-US" dirty="0">
@@ -5521,7 +6418,7 @@
           <a:p>
             <a:r>
               <a:rPr lang="en-US" dirty="0"/>
-              <a:t>World population: world development indicators/world bank</a:t>
+              <a:t>World population: World Development Indicators/World Bank</a:t>
             </a:r>
           </a:p>
         </p:txBody>

</xml_diff>